<commit_message>
+pptx and small fix
</commit_message>
<xml_diff>
--- a/общие/презетация.pptx
+++ b/общие/презетация.pptx
@@ -11,7 +11,9 @@
     <p:sldId id="260" r:id="rId5"/>
     <p:sldId id="261" r:id="rId6"/>
     <p:sldId id="262" r:id="rId7"/>
-    <p:sldId id="259" r:id="rId8"/>
+    <p:sldId id="263" r:id="rId8"/>
+    <p:sldId id="264" r:id="rId9"/>
+    <p:sldId id="259" r:id="rId10"/>
   </p:sldIdLst>
   <p:sldSz cx="12192000" cy="6858000"/>
   <p:notesSz cx="6858000" cy="9144000"/>
@@ -110,6 +112,22 @@
       </a:defRPr>
     </a:lvl9pPr>
   </p:defaultTextStyle>
+  <p:extLst>
+    <p:ext uri="{EFAFB233-063F-42B5-8137-9DF3F51BA10A}">
+      <p15:sldGuideLst xmlns:p15="http://schemas.microsoft.com/office/powerpoint/2012/main">
+        <p15:guide id="1" orient="horz" pos="2160">
+          <p15:clr>
+            <a:srgbClr val="A4A3A4"/>
+          </p15:clr>
+        </p15:guide>
+        <p15:guide id="2" pos="3840">
+          <p15:clr>
+            <a:srgbClr val="A4A3A4"/>
+          </p15:clr>
+        </p15:guide>
+      </p15:sldGuideLst>
+    </p:ext>
+  </p:extLst>
 </p:presentation>
 </file>
 
@@ -135,7 +153,7 @@
           <p:cNvPr id="2" name="Заголовок 1">
             <a:extLst>
               <a:ext uri="{FF2B5EF4-FFF2-40B4-BE49-F238E27FC236}">
-                <a16:creationId xmlns:a16="http://schemas.microsoft.com/office/drawing/2014/main" xmlns="" id="{E24156CF-4A9B-4BA5-98A9-FCD8D40EF1C4}"/>
+                <a16:creationId xmlns:a16="http://schemas.microsoft.com/office/drawing/2014/main" id="{E24156CF-4A9B-4BA5-98A9-FCD8D40EF1C4}"/>
               </a:ext>
             </a:extLst>
           </p:cNvPr>
@@ -172,7 +190,7 @@
           <p:cNvPr id="3" name="Подзаголовок 2">
             <a:extLst>
               <a:ext uri="{FF2B5EF4-FFF2-40B4-BE49-F238E27FC236}">
-                <a16:creationId xmlns:a16="http://schemas.microsoft.com/office/drawing/2014/main" xmlns="" id="{71EF96AB-BF69-4F77-8092-860312062B86}"/>
+                <a16:creationId xmlns:a16="http://schemas.microsoft.com/office/drawing/2014/main" id="{71EF96AB-BF69-4F77-8092-860312062B86}"/>
               </a:ext>
             </a:extLst>
           </p:cNvPr>
@@ -242,7 +260,7 @@
           <p:cNvPr id="4" name="Дата 3">
             <a:extLst>
               <a:ext uri="{FF2B5EF4-FFF2-40B4-BE49-F238E27FC236}">
-                <a16:creationId xmlns:a16="http://schemas.microsoft.com/office/drawing/2014/main" xmlns="" id="{BD635B79-D75A-495F-844C-BE2C142D8571}"/>
+                <a16:creationId xmlns:a16="http://schemas.microsoft.com/office/drawing/2014/main" id="{BD635B79-D75A-495F-844C-BE2C142D8571}"/>
               </a:ext>
             </a:extLst>
           </p:cNvPr>
@@ -261,7 +279,7 @@
             <a:fld id="{9134C4E8-7CCD-4159-9FAF-0E66431A957A}" type="datetimeFigureOut">
               <a:rPr lang="ru-RU" smtClean="0"/>
               <a:pPr/>
-              <a:t>21.01.2022</a:t>
+              <a:t>28.10.2022</a:t>
             </a:fld>
             <a:endParaRPr lang="ru-RU"/>
           </a:p>
@@ -272,7 +290,7 @@
           <p:cNvPr id="5" name="Нижний колонтитул 4">
             <a:extLst>
               <a:ext uri="{FF2B5EF4-FFF2-40B4-BE49-F238E27FC236}">
-                <a16:creationId xmlns:a16="http://schemas.microsoft.com/office/drawing/2014/main" xmlns="" id="{FDEDED1D-DF62-4DE4-87C9-F48BEC39A7FB}"/>
+                <a16:creationId xmlns:a16="http://schemas.microsoft.com/office/drawing/2014/main" id="{FDEDED1D-DF62-4DE4-87C9-F48BEC39A7FB}"/>
               </a:ext>
             </a:extLst>
           </p:cNvPr>
@@ -297,7 +315,7 @@
           <p:cNvPr id="6" name="Номер слайда 5">
             <a:extLst>
               <a:ext uri="{FF2B5EF4-FFF2-40B4-BE49-F238E27FC236}">
-                <a16:creationId xmlns:a16="http://schemas.microsoft.com/office/drawing/2014/main" xmlns="" id="{A5072B4B-092A-4941-9E2C-9C7C974660D6}"/>
+                <a16:creationId xmlns:a16="http://schemas.microsoft.com/office/drawing/2014/main" id="{A5072B4B-092A-4941-9E2C-9C7C974660D6}"/>
               </a:ext>
             </a:extLst>
           </p:cNvPr>
@@ -325,7 +343,7 @@
     </p:spTree>
     <p:extLst>
       <p:ext uri="{BB962C8B-B14F-4D97-AF65-F5344CB8AC3E}">
-        <p14:creationId xmlns:p14="http://schemas.microsoft.com/office/powerpoint/2010/main" xmlns="" val="3795762011"/>
+        <p14:creationId xmlns:p14="http://schemas.microsoft.com/office/powerpoint/2010/main" val="3795762011"/>
       </p:ext>
     </p:extLst>
   </p:cSld>
@@ -357,7 +375,7 @@
           <p:cNvPr id="2" name="Заголовок 1">
             <a:extLst>
               <a:ext uri="{FF2B5EF4-FFF2-40B4-BE49-F238E27FC236}">
-                <a16:creationId xmlns:a16="http://schemas.microsoft.com/office/drawing/2014/main" xmlns="" id="{11859EFC-3020-46EA-A361-89AD4E52C77A}"/>
+                <a16:creationId xmlns:a16="http://schemas.microsoft.com/office/drawing/2014/main" id="{11859EFC-3020-46EA-A361-89AD4E52C77A}"/>
               </a:ext>
             </a:extLst>
           </p:cNvPr>
@@ -385,7 +403,7 @@
           <p:cNvPr id="3" name="Вертикальный текст 2">
             <a:extLst>
               <a:ext uri="{FF2B5EF4-FFF2-40B4-BE49-F238E27FC236}">
-                <a16:creationId xmlns:a16="http://schemas.microsoft.com/office/drawing/2014/main" xmlns="" id="{D261AF8A-60A9-433B-BAB7-018227DCEA20}"/>
+                <a16:creationId xmlns:a16="http://schemas.microsoft.com/office/drawing/2014/main" id="{D261AF8A-60A9-433B-BAB7-018227DCEA20}"/>
               </a:ext>
             </a:extLst>
           </p:cNvPr>
@@ -442,7 +460,7 @@
           <p:cNvPr id="4" name="Дата 3">
             <a:extLst>
               <a:ext uri="{FF2B5EF4-FFF2-40B4-BE49-F238E27FC236}">
-                <a16:creationId xmlns:a16="http://schemas.microsoft.com/office/drawing/2014/main" xmlns="" id="{5C5C1C23-670F-439C-BB40-3951F3E8122D}"/>
+                <a16:creationId xmlns:a16="http://schemas.microsoft.com/office/drawing/2014/main" id="{5C5C1C23-670F-439C-BB40-3951F3E8122D}"/>
               </a:ext>
             </a:extLst>
           </p:cNvPr>
@@ -461,7 +479,7 @@
             <a:fld id="{9134C4E8-7CCD-4159-9FAF-0E66431A957A}" type="datetimeFigureOut">
               <a:rPr lang="ru-RU" smtClean="0"/>
               <a:pPr/>
-              <a:t>21.01.2022</a:t>
+              <a:t>28.10.2022</a:t>
             </a:fld>
             <a:endParaRPr lang="ru-RU"/>
           </a:p>
@@ -472,7 +490,7 @@
           <p:cNvPr id="5" name="Нижний колонтитул 4">
             <a:extLst>
               <a:ext uri="{FF2B5EF4-FFF2-40B4-BE49-F238E27FC236}">
-                <a16:creationId xmlns:a16="http://schemas.microsoft.com/office/drawing/2014/main" xmlns="" id="{A5A6C9F4-D50B-436A-ADA2-5684ABE06AC9}"/>
+                <a16:creationId xmlns:a16="http://schemas.microsoft.com/office/drawing/2014/main" id="{A5A6C9F4-D50B-436A-ADA2-5684ABE06AC9}"/>
               </a:ext>
             </a:extLst>
           </p:cNvPr>
@@ -497,7 +515,7 @@
           <p:cNvPr id="6" name="Номер слайда 5">
             <a:extLst>
               <a:ext uri="{FF2B5EF4-FFF2-40B4-BE49-F238E27FC236}">
-                <a16:creationId xmlns:a16="http://schemas.microsoft.com/office/drawing/2014/main" xmlns="" id="{642C042B-948D-45C7-AEE0-07B399112559}"/>
+                <a16:creationId xmlns:a16="http://schemas.microsoft.com/office/drawing/2014/main" id="{642C042B-948D-45C7-AEE0-07B399112559}"/>
               </a:ext>
             </a:extLst>
           </p:cNvPr>
@@ -525,7 +543,7 @@
     </p:spTree>
     <p:extLst>
       <p:ext uri="{BB962C8B-B14F-4D97-AF65-F5344CB8AC3E}">
-        <p14:creationId xmlns:p14="http://schemas.microsoft.com/office/powerpoint/2010/main" xmlns="" val="2501292164"/>
+        <p14:creationId xmlns:p14="http://schemas.microsoft.com/office/powerpoint/2010/main" val="2501292164"/>
       </p:ext>
     </p:extLst>
   </p:cSld>
@@ -557,7 +575,7 @@
           <p:cNvPr id="2" name="Вертикальный заголовок 1">
             <a:extLst>
               <a:ext uri="{FF2B5EF4-FFF2-40B4-BE49-F238E27FC236}">
-                <a16:creationId xmlns:a16="http://schemas.microsoft.com/office/drawing/2014/main" xmlns="" id="{0EA67926-503F-4595-A560-45CC69D82BB5}"/>
+                <a16:creationId xmlns:a16="http://schemas.microsoft.com/office/drawing/2014/main" id="{0EA67926-503F-4595-A560-45CC69D82BB5}"/>
               </a:ext>
             </a:extLst>
           </p:cNvPr>
@@ -590,7 +608,7 @@
           <p:cNvPr id="3" name="Вертикальный текст 2">
             <a:extLst>
               <a:ext uri="{FF2B5EF4-FFF2-40B4-BE49-F238E27FC236}">
-                <a16:creationId xmlns:a16="http://schemas.microsoft.com/office/drawing/2014/main" xmlns="" id="{FF655F64-7D09-47A6-8D17-DF96AA85CCCD}"/>
+                <a16:creationId xmlns:a16="http://schemas.microsoft.com/office/drawing/2014/main" id="{FF655F64-7D09-47A6-8D17-DF96AA85CCCD}"/>
               </a:ext>
             </a:extLst>
           </p:cNvPr>
@@ -652,7 +670,7 @@
           <p:cNvPr id="4" name="Дата 3">
             <a:extLst>
               <a:ext uri="{FF2B5EF4-FFF2-40B4-BE49-F238E27FC236}">
-                <a16:creationId xmlns:a16="http://schemas.microsoft.com/office/drawing/2014/main" xmlns="" id="{6C801C87-5535-4F57-84EA-4778368B20B8}"/>
+                <a16:creationId xmlns:a16="http://schemas.microsoft.com/office/drawing/2014/main" id="{6C801C87-5535-4F57-84EA-4778368B20B8}"/>
               </a:ext>
             </a:extLst>
           </p:cNvPr>
@@ -671,7 +689,7 @@
             <a:fld id="{9134C4E8-7CCD-4159-9FAF-0E66431A957A}" type="datetimeFigureOut">
               <a:rPr lang="ru-RU" smtClean="0"/>
               <a:pPr/>
-              <a:t>21.01.2022</a:t>
+              <a:t>28.10.2022</a:t>
             </a:fld>
             <a:endParaRPr lang="ru-RU"/>
           </a:p>
@@ -682,7 +700,7 @@
           <p:cNvPr id="5" name="Нижний колонтитул 4">
             <a:extLst>
               <a:ext uri="{FF2B5EF4-FFF2-40B4-BE49-F238E27FC236}">
-                <a16:creationId xmlns:a16="http://schemas.microsoft.com/office/drawing/2014/main" xmlns="" id="{A9470994-AF08-4324-A75C-AB6B0E63DAF3}"/>
+                <a16:creationId xmlns:a16="http://schemas.microsoft.com/office/drawing/2014/main" id="{A9470994-AF08-4324-A75C-AB6B0E63DAF3}"/>
               </a:ext>
             </a:extLst>
           </p:cNvPr>
@@ -707,7 +725,7 @@
           <p:cNvPr id="6" name="Номер слайда 5">
             <a:extLst>
               <a:ext uri="{FF2B5EF4-FFF2-40B4-BE49-F238E27FC236}">
-                <a16:creationId xmlns:a16="http://schemas.microsoft.com/office/drawing/2014/main" xmlns="" id="{3D681D54-F5AD-4443-9620-0F93284120A6}"/>
+                <a16:creationId xmlns:a16="http://schemas.microsoft.com/office/drawing/2014/main" id="{3D681D54-F5AD-4443-9620-0F93284120A6}"/>
               </a:ext>
             </a:extLst>
           </p:cNvPr>
@@ -735,7 +753,7 @@
     </p:spTree>
     <p:extLst>
       <p:ext uri="{BB962C8B-B14F-4D97-AF65-F5344CB8AC3E}">
-        <p14:creationId xmlns:p14="http://schemas.microsoft.com/office/powerpoint/2010/main" xmlns="" val="2246139088"/>
+        <p14:creationId xmlns:p14="http://schemas.microsoft.com/office/powerpoint/2010/main" val="2246139088"/>
       </p:ext>
     </p:extLst>
   </p:cSld>
@@ -767,7 +785,7 @@
           <p:cNvPr id="2" name="Заголовок 1">
             <a:extLst>
               <a:ext uri="{FF2B5EF4-FFF2-40B4-BE49-F238E27FC236}">
-                <a16:creationId xmlns:a16="http://schemas.microsoft.com/office/drawing/2014/main" xmlns="" id="{80811D83-5074-423B-8265-CD212C9F6C16}"/>
+                <a16:creationId xmlns:a16="http://schemas.microsoft.com/office/drawing/2014/main" id="{80811D83-5074-423B-8265-CD212C9F6C16}"/>
               </a:ext>
             </a:extLst>
           </p:cNvPr>
@@ -795,7 +813,7 @@
           <p:cNvPr id="3" name="Объект 2">
             <a:extLst>
               <a:ext uri="{FF2B5EF4-FFF2-40B4-BE49-F238E27FC236}">
-                <a16:creationId xmlns:a16="http://schemas.microsoft.com/office/drawing/2014/main" xmlns="" id="{FD82A2EC-5C89-4942-9089-0B1B4DF65F6D}"/>
+                <a16:creationId xmlns:a16="http://schemas.microsoft.com/office/drawing/2014/main" id="{FD82A2EC-5C89-4942-9089-0B1B4DF65F6D}"/>
               </a:ext>
             </a:extLst>
           </p:cNvPr>
@@ -852,7 +870,7 @@
           <p:cNvPr id="4" name="Дата 3">
             <a:extLst>
               <a:ext uri="{FF2B5EF4-FFF2-40B4-BE49-F238E27FC236}">
-                <a16:creationId xmlns:a16="http://schemas.microsoft.com/office/drawing/2014/main" xmlns="" id="{CB284823-1125-441A-81FC-1A6904F92EC2}"/>
+                <a16:creationId xmlns:a16="http://schemas.microsoft.com/office/drawing/2014/main" id="{CB284823-1125-441A-81FC-1A6904F92EC2}"/>
               </a:ext>
             </a:extLst>
           </p:cNvPr>
@@ -871,7 +889,7 @@
             <a:fld id="{9134C4E8-7CCD-4159-9FAF-0E66431A957A}" type="datetimeFigureOut">
               <a:rPr lang="ru-RU" smtClean="0"/>
               <a:pPr/>
-              <a:t>21.01.2022</a:t>
+              <a:t>28.10.2022</a:t>
             </a:fld>
             <a:endParaRPr lang="ru-RU"/>
           </a:p>
@@ -882,7 +900,7 @@
           <p:cNvPr id="5" name="Нижний колонтитул 4">
             <a:extLst>
               <a:ext uri="{FF2B5EF4-FFF2-40B4-BE49-F238E27FC236}">
-                <a16:creationId xmlns:a16="http://schemas.microsoft.com/office/drawing/2014/main" xmlns="" id="{8D9D0795-F190-40C7-B6B6-7A3991BD2A25}"/>
+                <a16:creationId xmlns:a16="http://schemas.microsoft.com/office/drawing/2014/main" id="{8D9D0795-F190-40C7-B6B6-7A3991BD2A25}"/>
               </a:ext>
             </a:extLst>
           </p:cNvPr>
@@ -907,7 +925,7 @@
           <p:cNvPr id="6" name="Номер слайда 5">
             <a:extLst>
               <a:ext uri="{FF2B5EF4-FFF2-40B4-BE49-F238E27FC236}">
-                <a16:creationId xmlns:a16="http://schemas.microsoft.com/office/drawing/2014/main" xmlns="" id="{32441501-9A00-4C9D-8AAE-18975E493315}"/>
+                <a16:creationId xmlns:a16="http://schemas.microsoft.com/office/drawing/2014/main" id="{32441501-9A00-4C9D-8AAE-18975E493315}"/>
               </a:ext>
             </a:extLst>
           </p:cNvPr>
@@ -935,7 +953,7 @@
     </p:spTree>
     <p:extLst>
       <p:ext uri="{BB962C8B-B14F-4D97-AF65-F5344CB8AC3E}">
-        <p14:creationId xmlns:p14="http://schemas.microsoft.com/office/powerpoint/2010/main" xmlns="" val="1835776417"/>
+        <p14:creationId xmlns:p14="http://schemas.microsoft.com/office/powerpoint/2010/main" val="1835776417"/>
       </p:ext>
     </p:extLst>
   </p:cSld>
@@ -967,7 +985,7 @@
           <p:cNvPr id="2" name="Заголовок 1">
             <a:extLst>
               <a:ext uri="{FF2B5EF4-FFF2-40B4-BE49-F238E27FC236}">
-                <a16:creationId xmlns:a16="http://schemas.microsoft.com/office/drawing/2014/main" xmlns="" id="{26F27C41-618D-4855-B336-EB1CA91AB790}"/>
+                <a16:creationId xmlns:a16="http://schemas.microsoft.com/office/drawing/2014/main" id="{26F27C41-618D-4855-B336-EB1CA91AB790}"/>
               </a:ext>
             </a:extLst>
           </p:cNvPr>
@@ -1004,7 +1022,7 @@
           <p:cNvPr id="3" name="Текст 2">
             <a:extLst>
               <a:ext uri="{FF2B5EF4-FFF2-40B4-BE49-F238E27FC236}">
-                <a16:creationId xmlns:a16="http://schemas.microsoft.com/office/drawing/2014/main" xmlns="" id="{E04A837B-44CB-4C5B-988E-2ED2CC4D8309}"/>
+                <a16:creationId xmlns:a16="http://schemas.microsoft.com/office/drawing/2014/main" id="{E04A837B-44CB-4C5B-988E-2ED2CC4D8309}"/>
               </a:ext>
             </a:extLst>
           </p:cNvPr>
@@ -1129,7 +1147,7 @@
           <p:cNvPr id="4" name="Дата 3">
             <a:extLst>
               <a:ext uri="{FF2B5EF4-FFF2-40B4-BE49-F238E27FC236}">
-                <a16:creationId xmlns:a16="http://schemas.microsoft.com/office/drawing/2014/main" xmlns="" id="{95D19652-5E33-47AB-8CB0-CA83DA548E88}"/>
+                <a16:creationId xmlns:a16="http://schemas.microsoft.com/office/drawing/2014/main" id="{95D19652-5E33-47AB-8CB0-CA83DA548E88}"/>
               </a:ext>
             </a:extLst>
           </p:cNvPr>
@@ -1148,7 +1166,7 @@
             <a:fld id="{9134C4E8-7CCD-4159-9FAF-0E66431A957A}" type="datetimeFigureOut">
               <a:rPr lang="ru-RU" smtClean="0"/>
               <a:pPr/>
-              <a:t>21.01.2022</a:t>
+              <a:t>28.10.2022</a:t>
             </a:fld>
             <a:endParaRPr lang="ru-RU"/>
           </a:p>
@@ -1159,7 +1177,7 @@
           <p:cNvPr id="5" name="Нижний колонтитул 4">
             <a:extLst>
               <a:ext uri="{FF2B5EF4-FFF2-40B4-BE49-F238E27FC236}">
-                <a16:creationId xmlns:a16="http://schemas.microsoft.com/office/drawing/2014/main" xmlns="" id="{CD48AB52-DB64-4001-95A8-FCEA1CB5B054}"/>
+                <a16:creationId xmlns:a16="http://schemas.microsoft.com/office/drawing/2014/main" id="{CD48AB52-DB64-4001-95A8-FCEA1CB5B054}"/>
               </a:ext>
             </a:extLst>
           </p:cNvPr>
@@ -1184,7 +1202,7 @@
           <p:cNvPr id="6" name="Номер слайда 5">
             <a:extLst>
               <a:ext uri="{FF2B5EF4-FFF2-40B4-BE49-F238E27FC236}">
-                <a16:creationId xmlns:a16="http://schemas.microsoft.com/office/drawing/2014/main" xmlns="" id="{72A44571-4E7C-4EE8-90E1-6827B306B74C}"/>
+                <a16:creationId xmlns:a16="http://schemas.microsoft.com/office/drawing/2014/main" id="{72A44571-4E7C-4EE8-90E1-6827B306B74C}"/>
               </a:ext>
             </a:extLst>
           </p:cNvPr>
@@ -1212,7 +1230,7 @@
     </p:spTree>
     <p:extLst>
       <p:ext uri="{BB962C8B-B14F-4D97-AF65-F5344CB8AC3E}">
-        <p14:creationId xmlns:p14="http://schemas.microsoft.com/office/powerpoint/2010/main" xmlns="" val="1793728177"/>
+        <p14:creationId xmlns:p14="http://schemas.microsoft.com/office/powerpoint/2010/main" val="1793728177"/>
       </p:ext>
     </p:extLst>
   </p:cSld>
@@ -1244,7 +1262,7 @@
           <p:cNvPr id="2" name="Заголовок 1">
             <a:extLst>
               <a:ext uri="{FF2B5EF4-FFF2-40B4-BE49-F238E27FC236}">
-                <a16:creationId xmlns:a16="http://schemas.microsoft.com/office/drawing/2014/main" xmlns="" id="{488AC8AD-3232-47FC-B782-DBABFD7551A0}"/>
+                <a16:creationId xmlns:a16="http://schemas.microsoft.com/office/drawing/2014/main" id="{488AC8AD-3232-47FC-B782-DBABFD7551A0}"/>
               </a:ext>
             </a:extLst>
           </p:cNvPr>
@@ -1272,7 +1290,7 @@
           <p:cNvPr id="3" name="Объект 2">
             <a:extLst>
               <a:ext uri="{FF2B5EF4-FFF2-40B4-BE49-F238E27FC236}">
-                <a16:creationId xmlns:a16="http://schemas.microsoft.com/office/drawing/2014/main" xmlns="" id="{D29086D1-4B03-4947-9AA7-D0A34293101F}"/>
+                <a16:creationId xmlns:a16="http://schemas.microsoft.com/office/drawing/2014/main" id="{D29086D1-4B03-4947-9AA7-D0A34293101F}"/>
               </a:ext>
             </a:extLst>
           </p:cNvPr>
@@ -1334,7 +1352,7 @@
           <p:cNvPr id="4" name="Объект 3">
             <a:extLst>
               <a:ext uri="{FF2B5EF4-FFF2-40B4-BE49-F238E27FC236}">
-                <a16:creationId xmlns:a16="http://schemas.microsoft.com/office/drawing/2014/main" xmlns="" id="{9B931452-E228-416A-9CF8-CDB229ACCA59}"/>
+                <a16:creationId xmlns:a16="http://schemas.microsoft.com/office/drawing/2014/main" id="{9B931452-E228-416A-9CF8-CDB229ACCA59}"/>
               </a:ext>
             </a:extLst>
           </p:cNvPr>
@@ -1396,7 +1414,7 @@
           <p:cNvPr id="5" name="Дата 4">
             <a:extLst>
               <a:ext uri="{FF2B5EF4-FFF2-40B4-BE49-F238E27FC236}">
-                <a16:creationId xmlns:a16="http://schemas.microsoft.com/office/drawing/2014/main" xmlns="" id="{3BE2E8FD-79BB-4A2A-8A70-6BD46678F910}"/>
+                <a16:creationId xmlns:a16="http://schemas.microsoft.com/office/drawing/2014/main" id="{3BE2E8FD-79BB-4A2A-8A70-6BD46678F910}"/>
               </a:ext>
             </a:extLst>
           </p:cNvPr>
@@ -1415,7 +1433,7 @@
             <a:fld id="{9134C4E8-7CCD-4159-9FAF-0E66431A957A}" type="datetimeFigureOut">
               <a:rPr lang="ru-RU" smtClean="0"/>
               <a:pPr/>
-              <a:t>21.01.2022</a:t>
+              <a:t>28.10.2022</a:t>
             </a:fld>
             <a:endParaRPr lang="ru-RU"/>
           </a:p>
@@ -1426,7 +1444,7 @@
           <p:cNvPr id="6" name="Нижний колонтитул 5">
             <a:extLst>
               <a:ext uri="{FF2B5EF4-FFF2-40B4-BE49-F238E27FC236}">
-                <a16:creationId xmlns:a16="http://schemas.microsoft.com/office/drawing/2014/main" xmlns="" id="{BCB4FB01-D124-4D47-A159-2BEBB946C168}"/>
+                <a16:creationId xmlns:a16="http://schemas.microsoft.com/office/drawing/2014/main" id="{BCB4FB01-D124-4D47-A159-2BEBB946C168}"/>
               </a:ext>
             </a:extLst>
           </p:cNvPr>
@@ -1451,7 +1469,7 @@
           <p:cNvPr id="7" name="Номер слайда 6">
             <a:extLst>
               <a:ext uri="{FF2B5EF4-FFF2-40B4-BE49-F238E27FC236}">
-                <a16:creationId xmlns:a16="http://schemas.microsoft.com/office/drawing/2014/main" xmlns="" id="{12D557CD-1570-44B6-9497-5820C1A62BA6}"/>
+                <a16:creationId xmlns:a16="http://schemas.microsoft.com/office/drawing/2014/main" id="{12D557CD-1570-44B6-9497-5820C1A62BA6}"/>
               </a:ext>
             </a:extLst>
           </p:cNvPr>
@@ -1479,7 +1497,7 @@
     </p:spTree>
     <p:extLst>
       <p:ext uri="{BB962C8B-B14F-4D97-AF65-F5344CB8AC3E}">
-        <p14:creationId xmlns:p14="http://schemas.microsoft.com/office/powerpoint/2010/main" xmlns="" val="1935585155"/>
+        <p14:creationId xmlns:p14="http://schemas.microsoft.com/office/powerpoint/2010/main" val="1935585155"/>
       </p:ext>
     </p:extLst>
   </p:cSld>
@@ -1511,7 +1529,7 @@
           <p:cNvPr id="2" name="Заголовок 1">
             <a:extLst>
               <a:ext uri="{FF2B5EF4-FFF2-40B4-BE49-F238E27FC236}">
-                <a16:creationId xmlns:a16="http://schemas.microsoft.com/office/drawing/2014/main" xmlns="" id="{8D418DB5-0CF3-4D08-A836-8C87449A05EB}"/>
+                <a16:creationId xmlns:a16="http://schemas.microsoft.com/office/drawing/2014/main" id="{8D418DB5-0CF3-4D08-A836-8C87449A05EB}"/>
               </a:ext>
             </a:extLst>
           </p:cNvPr>
@@ -1544,7 +1562,7 @@
           <p:cNvPr id="3" name="Текст 2">
             <a:extLst>
               <a:ext uri="{FF2B5EF4-FFF2-40B4-BE49-F238E27FC236}">
-                <a16:creationId xmlns:a16="http://schemas.microsoft.com/office/drawing/2014/main" xmlns="" id="{F51E601B-0751-4484-8AE4-60FA0F82083B}"/>
+                <a16:creationId xmlns:a16="http://schemas.microsoft.com/office/drawing/2014/main" id="{F51E601B-0751-4484-8AE4-60FA0F82083B}"/>
               </a:ext>
             </a:extLst>
           </p:cNvPr>
@@ -1615,7 +1633,7 @@
           <p:cNvPr id="4" name="Объект 3">
             <a:extLst>
               <a:ext uri="{FF2B5EF4-FFF2-40B4-BE49-F238E27FC236}">
-                <a16:creationId xmlns:a16="http://schemas.microsoft.com/office/drawing/2014/main" xmlns="" id="{BAC92042-1811-4578-A3E6-0B05ECBE7E9D}"/>
+                <a16:creationId xmlns:a16="http://schemas.microsoft.com/office/drawing/2014/main" id="{BAC92042-1811-4578-A3E6-0B05ECBE7E9D}"/>
               </a:ext>
             </a:extLst>
           </p:cNvPr>
@@ -1677,7 +1695,7 @@
           <p:cNvPr id="5" name="Текст 4">
             <a:extLst>
               <a:ext uri="{FF2B5EF4-FFF2-40B4-BE49-F238E27FC236}">
-                <a16:creationId xmlns:a16="http://schemas.microsoft.com/office/drawing/2014/main" xmlns="" id="{CFF00458-EF47-4089-8512-C043AF122A38}"/>
+                <a16:creationId xmlns:a16="http://schemas.microsoft.com/office/drawing/2014/main" id="{CFF00458-EF47-4089-8512-C043AF122A38}"/>
               </a:ext>
             </a:extLst>
           </p:cNvPr>
@@ -1748,7 +1766,7 @@
           <p:cNvPr id="6" name="Объект 5">
             <a:extLst>
               <a:ext uri="{FF2B5EF4-FFF2-40B4-BE49-F238E27FC236}">
-                <a16:creationId xmlns:a16="http://schemas.microsoft.com/office/drawing/2014/main" xmlns="" id="{055791E4-52F3-4485-96E2-693924AFB002}"/>
+                <a16:creationId xmlns:a16="http://schemas.microsoft.com/office/drawing/2014/main" id="{055791E4-52F3-4485-96E2-693924AFB002}"/>
               </a:ext>
             </a:extLst>
           </p:cNvPr>
@@ -1810,7 +1828,7 @@
           <p:cNvPr id="7" name="Дата 6">
             <a:extLst>
               <a:ext uri="{FF2B5EF4-FFF2-40B4-BE49-F238E27FC236}">
-                <a16:creationId xmlns:a16="http://schemas.microsoft.com/office/drawing/2014/main" xmlns="" id="{B6B3166B-1915-4744-859C-9B84F2DD8334}"/>
+                <a16:creationId xmlns:a16="http://schemas.microsoft.com/office/drawing/2014/main" id="{B6B3166B-1915-4744-859C-9B84F2DD8334}"/>
               </a:ext>
             </a:extLst>
           </p:cNvPr>
@@ -1829,7 +1847,7 @@
             <a:fld id="{9134C4E8-7CCD-4159-9FAF-0E66431A957A}" type="datetimeFigureOut">
               <a:rPr lang="ru-RU" smtClean="0"/>
               <a:pPr/>
-              <a:t>21.01.2022</a:t>
+              <a:t>28.10.2022</a:t>
             </a:fld>
             <a:endParaRPr lang="ru-RU"/>
           </a:p>
@@ -1840,7 +1858,7 @@
           <p:cNvPr id="8" name="Нижний колонтитул 7">
             <a:extLst>
               <a:ext uri="{FF2B5EF4-FFF2-40B4-BE49-F238E27FC236}">
-                <a16:creationId xmlns:a16="http://schemas.microsoft.com/office/drawing/2014/main" xmlns="" id="{1B2CA5CA-5BCF-4682-BA6B-0D195748BD1B}"/>
+                <a16:creationId xmlns:a16="http://schemas.microsoft.com/office/drawing/2014/main" id="{1B2CA5CA-5BCF-4682-BA6B-0D195748BD1B}"/>
               </a:ext>
             </a:extLst>
           </p:cNvPr>
@@ -1865,7 +1883,7 @@
           <p:cNvPr id="9" name="Номер слайда 8">
             <a:extLst>
               <a:ext uri="{FF2B5EF4-FFF2-40B4-BE49-F238E27FC236}">
-                <a16:creationId xmlns:a16="http://schemas.microsoft.com/office/drawing/2014/main" xmlns="" id="{D2976182-0D35-43E2-856D-8025413E494D}"/>
+                <a16:creationId xmlns:a16="http://schemas.microsoft.com/office/drawing/2014/main" id="{D2976182-0D35-43E2-856D-8025413E494D}"/>
               </a:ext>
             </a:extLst>
           </p:cNvPr>
@@ -1893,7 +1911,7 @@
     </p:spTree>
     <p:extLst>
       <p:ext uri="{BB962C8B-B14F-4D97-AF65-F5344CB8AC3E}">
-        <p14:creationId xmlns:p14="http://schemas.microsoft.com/office/powerpoint/2010/main" xmlns="" val="929767342"/>
+        <p14:creationId xmlns:p14="http://schemas.microsoft.com/office/powerpoint/2010/main" val="929767342"/>
       </p:ext>
     </p:extLst>
   </p:cSld>
@@ -1925,7 +1943,7 @@
           <p:cNvPr id="2" name="Заголовок 1">
             <a:extLst>
               <a:ext uri="{FF2B5EF4-FFF2-40B4-BE49-F238E27FC236}">
-                <a16:creationId xmlns:a16="http://schemas.microsoft.com/office/drawing/2014/main" xmlns="" id="{2C4AE2F2-EF57-4B52-AE9F-E39E1AFE64A4}"/>
+                <a16:creationId xmlns:a16="http://schemas.microsoft.com/office/drawing/2014/main" id="{2C4AE2F2-EF57-4B52-AE9F-E39E1AFE64A4}"/>
               </a:ext>
             </a:extLst>
           </p:cNvPr>
@@ -1953,7 +1971,7 @@
           <p:cNvPr id="3" name="Дата 2">
             <a:extLst>
               <a:ext uri="{FF2B5EF4-FFF2-40B4-BE49-F238E27FC236}">
-                <a16:creationId xmlns:a16="http://schemas.microsoft.com/office/drawing/2014/main" xmlns="" id="{87527E2E-515D-41E6-95C7-1D512FA21F25}"/>
+                <a16:creationId xmlns:a16="http://schemas.microsoft.com/office/drawing/2014/main" id="{87527E2E-515D-41E6-95C7-1D512FA21F25}"/>
               </a:ext>
             </a:extLst>
           </p:cNvPr>
@@ -1972,7 +1990,7 @@
             <a:fld id="{9134C4E8-7CCD-4159-9FAF-0E66431A957A}" type="datetimeFigureOut">
               <a:rPr lang="ru-RU" smtClean="0"/>
               <a:pPr/>
-              <a:t>21.01.2022</a:t>
+              <a:t>28.10.2022</a:t>
             </a:fld>
             <a:endParaRPr lang="ru-RU"/>
           </a:p>
@@ -1983,7 +2001,7 @@
           <p:cNvPr id="4" name="Нижний колонтитул 3">
             <a:extLst>
               <a:ext uri="{FF2B5EF4-FFF2-40B4-BE49-F238E27FC236}">
-                <a16:creationId xmlns:a16="http://schemas.microsoft.com/office/drawing/2014/main" xmlns="" id="{845AC5B3-BE4B-4928-BB08-8BA9408E88FB}"/>
+                <a16:creationId xmlns:a16="http://schemas.microsoft.com/office/drawing/2014/main" id="{845AC5B3-BE4B-4928-BB08-8BA9408E88FB}"/>
               </a:ext>
             </a:extLst>
           </p:cNvPr>
@@ -2008,7 +2026,7 @@
           <p:cNvPr id="5" name="Номер слайда 4">
             <a:extLst>
               <a:ext uri="{FF2B5EF4-FFF2-40B4-BE49-F238E27FC236}">
-                <a16:creationId xmlns:a16="http://schemas.microsoft.com/office/drawing/2014/main" xmlns="" id="{6190FE16-12A0-4D98-BDD5-1A5BD81E548F}"/>
+                <a16:creationId xmlns:a16="http://schemas.microsoft.com/office/drawing/2014/main" id="{6190FE16-12A0-4D98-BDD5-1A5BD81E548F}"/>
               </a:ext>
             </a:extLst>
           </p:cNvPr>
@@ -2036,7 +2054,7 @@
     </p:spTree>
     <p:extLst>
       <p:ext uri="{BB962C8B-B14F-4D97-AF65-F5344CB8AC3E}">
-        <p14:creationId xmlns:p14="http://schemas.microsoft.com/office/powerpoint/2010/main" xmlns="" val="1392731294"/>
+        <p14:creationId xmlns:p14="http://schemas.microsoft.com/office/powerpoint/2010/main" val="1392731294"/>
       </p:ext>
     </p:extLst>
   </p:cSld>
@@ -2068,7 +2086,7 @@
           <p:cNvPr id="2" name="Дата 1">
             <a:extLst>
               <a:ext uri="{FF2B5EF4-FFF2-40B4-BE49-F238E27FC236}">
-                <a16:creationId xmlns:a16="http://schemas.microsoft.com/office/drawing/2014/main" xmlns="" id="{2AE9B5CE-10D0-44B4-8B79-C820EEBDAC85}"/>
+                <a16:creationId xmlns:a16="http://schemas.microsoft.com/office/drawing/2014/main" id="{2AE9B5CE-10D0-44B4-8B79-C820EEBDAC85}"/>
               </a:ext>
             </a:extLst>
           </p:cNvPr>
@@ -2087,7 +2105,7 @@
             <a:fld id="{9134C4E8-7CCD-4159-9FAF-0E66431A957A}" type="datetimeFigureOut">
               <a:rPr lang="ru-RU" smtClean="0"/>
               <a:pPr/>
-              <a:t>21.01.2022</a:t>
+              <a:t>28.10.2022</a:t>
             </a:fld>
             <a:endParaRPr lang="ru-RU"/>
           </a:p>
@@ -2098,7 +2116,7 @@
           <p:cNvPr id="3" name="Нижний колонтитул 2">
             <a:extLst>
               <a:ext uri="{FF2B5EF4-FFF2-40B4-BE49-F238E27FC236}">
-                <a16:creationId xmlns:a16="http://schemas.microsoft.com/office/drawing/2014/main" xmlns="" id="{F5BBD6FF-C01E-4D60-9832-2E97B1C61652}"/>
+                <a16:creationId xmlns:a16="http://schemas.microsoft.com/office/drawing/2014/main" id="{F5BBD6FF-C01E-4D60-9832-2E97B1C61652}"/>
               </a:ext>
             </a:extLst>
           </p:cNvPr>
@@ -2123,7 +2141,7 @@
           <p:cNvPr id="4" name="Номер слайда 3">
             <a:extLst>
               <a:ext uri="{FF2B5EF4-FFF2-40B4-BE49-F238E27FC236}">
-                <a16:creationId xmlns:a16="http://schemas.microsoft.com/office/drawing/2014/main" xmlns="" id="{87F1D286-8C9C-4FE9-A6D5-1F1527ADFD99}"/>
+                <a16:creationId xmlns:a16="http://schemas.microsoft.com/office/drawing/2014/main" id="{87F1D286-8C9C-4FE9-A6D5-1F1527ADFD99}"/>
               </a:ext>
             </a:extLst>
           </p:cNvPr>
@@ -2151,7 +2169,7 @@
     </p:spTree>
     <p:extLst>
       <p:ext uri="{BB962C8B-B14F-4D97-AF65-F5344CB8AC3E}">
-        <p14:creationId xmlns:p14="http://schemas.microsoft.com/office/powerpoint/2010/main" xmlns="" val="1024199689"/>
+        <p14:creationId xmlns:p14="http://schemas.microsoft.com/office/powerpoint/2010/main" val="1024199689"/>
       </p:ext>
     </p:extLst>
   </p:cSld>
@@ -2183,7 +2201,7 @@
           <p:cNvPr id="2" name="Заголовок 1">
             <a:extLst>
               <a:ext uri="{FF2B5EF4-FFF2-40B4-BE49-F238E27FC236}">
-                <a16:creationId xmlns:a16="http://schemas.microsoft.com/office/drawing/2014/main" xmlns="" id="{072B6A82-F351-4D32-94CE-2B49F50614C8}"/>
+                <a16:creationId xmlns:a16="http://schemas.microsoft.com/office/drawing/2014/main" id="{072B6A82-F351-4D32-94CE-2B49F50614C8}"/>
               </a:ext>
             </a:extLst>
           </p:cNvPr>
@@ -2220,7 +2238,7 @@
           <p:cNvPr id="3" name="Объект 2">
             <a:extLst>
               <a:ext uri="{FF2B5EF4-FFF2-40B4-BE49-F238E27FC236}">
-                <a16:creationId xmlns:a16="http://schemas.microsoft.com/office/drawing/2014/main" xmlns="" id="{140FBEE9-5564-4E21-A5A7-DC19C1319C89}"/>
+                <a16:creationId xmlns:a16="http://schemas.microsoft.com/office/drawing/2014/main" id="{140FBEE9-5564-4E21-A5A7-DC19C1319C89}"/>
               </a:ext>
             </a:extLst>
           </p:cNvPr>
@@ -2310,7 +2328,7 @@
           <p:cNvPr id="4" name="Текст 3">
             <a:extLst>
               <a:ext uri="{FF2B5EF4-FFF2-40B4-BE49-F238E27FC236}">
-                <a16:creationId xmlns:a16="http://schemas.microsoft.com/office/drawing/2014/main" xmlns="" id="{2FF7B7B8-BB88-42AF-92A8-AE927B3AF322}"/>
+                <a16:creationId xmlns:a16="http://schemas.microsoft.com/office/drawing/2014/main" id="{2FF7B7B8-BB88-42AF-92A8-AE927B3AF322}"/>
               </a:ext>
             </a:extLst>
           </p:cNvPr>
@@ -2381,7 +2399,7 @@
           <p:cNvPr id="5" name="Дата 4">
             <a:extLst>
               <a:ext uri="{FF2B5EF4-FFF2-40B4-BE49-F238E27FC236}">
-                <a16:creationId xmlns:a16="http://schemas.microsoft.com/office/drawing/2014/main" xmlns="" id="{F0BB04BE-8C39-4276-9C35-8E47C76FA4C8}"/>
+                <a16:creationId xmlns:a16="http://schemas.microsoft.com/office/drawing/2014/main" id="{F0BB04BE-8C39-4276-9C35-8E47C76FA4C8}"/>
               </a:ext>
             </a:extLst>
           </p:cNvPr>
@@ -2400,7 +2418,7 @@
             <a:fld id="{9134C4E8-7CCD-4159-9FAF-0E66431A957A}" type="datetimeFigureOut">
               <a:rPr lang="ru-RU" smtClean="0"/>
               <a:pPr/>
-              <a:t>21.01.2022</a:t>
+              <a:t>28.10.2022</a:t>
             </a:fld>
             <a:endParaRPr lang="ru-RU"/>
           </a:p>
@@ -2411,7 +2429,7 @@
           <p:cNvPr id="6" name="Нижний колонтитул 5">
             <a:extLst>
               <a:ext uri="{FF2B5EF4-FFF2-40B4-BE49-F238E27FC236}">
-                <a16:creationId xmlns:a16="http://schemas.microsoft.com/office/drawing/2014/main" xmlns="" id="{E519705D-2F03-47F4-8E72-43BE8DB7C5CE}"/>
+                <a16:creationId xmlns:a16="http://schemas.microsoft.com/office/drawing/2014/main" id="{E519705D-2F03-47F4-8E72-43BE8DB7C5CE}"/>
               </a:ext>
             </a:extLst>
           </p:cNvPr>
@@ -2436,7 +2454,7 @@
           <p:cNvPr id="7" name="Номер слайда 6">
             <a:extLst>
               <a:ext uri="{FF2B5EF4-FFF2-40B4-BE49-F238E27FC236}">
-                <a16:creationId xmlns:a16="http://schemas.microsoft.com/office/drawing/2014/main" xmlns="" id="{F0540216-45BE-4367-900F-F6A15145CAE9}"/>
+                <a16:creationId xmlns:a16="http://schemas.microsoft.com/office/drawing/2014/main" id="{F0540216-45BE-4367-900F-F6A15145CAE9}"/>
               </a:ext>
             </a:extLst>
           </p:cNvPr>
@@ -2464,7 +2482,7 @@
     </p:spTree>
     <p:extLst>
       <p:ext uri="{BB962C8B-B14F-4D97-AF65-F5344CB8AC3E}">
-        <p14:creationId xmlns:p14="http://schemas.microsoft.com/office/powerpoint/2010/main" xmlns="" val="2969205791"/>
+        <p14:creationId xmlns:p14="http://schemas.microsoft.com/office/powerpoint/2010/main" val="2969205791"/>
       </p:ext>
     </p:extLst>
   </p:cSld>
@@ -2496,7 +2514,7 @@
           <p:cNvPr id="2" name="Заголовок 1">
             <a:extLst>
               <a:ext uri="{FF2B5EF4-FFF2-40B4-BE49-F238E27FC236}">
-                <a16:creationId xmlns:a16="http://schemas.microsoft.com/office/drawing/2014/main" xmlns="" id="{E11FBE24-AAD8-41D6-8D0C-71DA59C6BB85}"/>
+                <a16:creationId xmlns:a16="http://schemas.microsoft.com/office/drawing/2014/main" id="{E11FBE24-AAD8-41D6-8D0C-71DA59C6BB85}"/>
               </a:ext>
             </a:extLst>
           </p:cNvPr>
@@ -2533,7 +2551,7 @@
           <p:cNvPr id="3" name="Рисунок 2">
             <a:extLst>
               <a:ext uri="{FF2B5EF4-FFF2-40B4-BE49-F238E27FC236}">
-                <a16:creationId xmlns:a16="http://schemas.microsoft.com/office/drawing/2014/main" xmlns="" id="{AC7D9A53-9BE4-4237-90BD-EF3188BBD01C}"/>
+                <a16:creationId xmlns:a16="http://schemas.microsoft.com/office/drawing/2014/main" id="{AC7D9A53-9BE4-4237-90BD-EF3188BBD01C}"/>
               </a:ext>
             </a:extLst>
           </p:cNvPr>
@@ -2600,7 +2618,7 @@
           <p:cNvPr id="4" name="Текст 3">
             <a:extLst>
               <a:ext uri="{FF2B5EF4-FFF2-40B4-BE49-F238E27FC236}">
-                <a16:creationId xmlns:a16="http://schemas.microsoft.com/office/drawing/2014/main" xmlns="" id="{806D0CD5-C538-416E-99C1-8FFC5E784C12}"/>
+                <a16:creationId xmlns:a16="http://schemas.microsoft.com/office/drawing/2014/main" id="{806D0CD5-C538-416E-99C1-8FFC5E784C12}"/>
               </a:ext>
             </a:extLst>
           </p:cNvPr>
@@ -2671,7 +2689,7 @@
           <p:cNvPr id="5" name="Дата 4">
             <a:extLst>
               <a:ext uri="{FF2B5EF4-FFF2-40B4-BE49-F238E27FC236}">
-                <a16:creationId xmlns:a16="http://schemas.microsoft.com/office/drawing/2014/main" xmlns="" id="{E1C091DD-DC18-48F5-959C-334F18F29359}"/>
+                <a16:creationId xmlns:a16="http://schemas.microsoft.com/office/drawing/2014/main" id="{E1C091DD-DC18-48F5-959C-334F18F29359}"/>
               </a:ext>
             </a:extLst>
           </p:cNvPr>
@@ -2690,7 +2708,7 @@
             <a:fld id="{9134C4E8-7CCD-4159-9FAF-0E66431A957A}" type="datetimeFigureOut">
               <a:rPr lang="ru-RU" smtClean="0"/>
               <a:pPr/>
-              <a:t>21.01.2022</a:t>
+              <a:t>28.10.2022</a:t>
             </a:fld>
             <a:endParaRPr lang="ru-RU"/>
           </a:p>
@@ -2701,7 +2719,7 @@
           <p:cNvPr id="6" name="Нижний колонтитул 5">
             <a:extLst>
               <a:ext uri="{FF2B5EF4-FFF2-40B4-BE49-F238E27FC236}">
-                <a16:creationId xmlns:a16="http://schemas.microsoft.com/office/drawing/2014/main" xmlns="" id="{D1326421-D6BF-47BA-AFF8-01C78405C186}"/>
+                <a16:creationId xmlns:a16="http://schemas.microsoft.com/office/drawing/2014/main" id="{D1326421-D6BF-47BA-AFF8-01C78405C186}"/>
               </a:ext>
             </a:extLst>
           </p:cNvPr>
@@ -2726,7 +2744,7 @@
           <p:cNvPr id="7" name="Номер слайда 6">
             <a:extLst>
               <a:ext uri="{FF2B5EF4-FFF2-40B4-BE49-F238E27FC236}">
-                <a16:creationId xmlns:a16="http://schemas.microsoft.com/office/drawing/2014/main" xmlns="" id="{8F20448D-234D-48A7-AEF5-6BE14536BA8F}"/>
+                <a16:creationId xmlns:a16="http://schemas.microsoft.com/office/drawing/2014/main" id="{8F20448D-234D-48A7-AEF5-6BE14536BA8F}"/>
               </a:ext>
             </a:extLst>
           </p:cNvPr>
@@ -2754,7 +2772,7 @@
     </p:spTree>
     <p:extLst>
       <p:ext uri="{BB962C8B-B14F-4D97-AF65-F5344CB8AC3E}">
-        <p14:creationId xmlns:p14="http://schemas.microsoft.com/office/powerpoint/2010/main" xmlns="" val="1476849693"/>
+        <p14:creationId xmlns:p14="http://schemas.microsoft.com/office/powerpoint/2010/main" val="1476849693"/>
       </p:ext>
     </p:extLst>
   </p:cSld>
@@ -2791,7 +2809,7 @@
           <p:cNvPr id="2" name="Заголовок 1">
             <a:extLst>
               <a:ext uri="{FF2B5EF4-FFF2-40B4-BE49-F238E27FC236}">
-                <a16:creationId xmlns:a16="http://schemas.microsoft.com/office/drawing/2014/main" xmlns="" id="{70D46971-B40D-4268-ADE2-AE7EA8EE5D68}"/>
+                <a16:creationId xmlns:a16="http://schemas.microsoft.com/office/drawing/2014/main" id="{70D46971-B40D-4268-ADE2-AE7EA8EE5D68}"/>
               </a:ext>
             </a:extLst>
           </p:cNvPr>
@@ -2829,7 +2847,7 @@
           <p:cNvPr id="3" name="Текст 2">
             <a:extLst>
               <a:ext uri="{FF2B5EF4-FFF2-40B4-BE49-F238E27FC236}">
-                <a16:creationId xmlns:a16="http://schemas.microsoft.com/office/drawing/2014/main" xmlns="" id="{E968CBE9-3363-466E-BF93-B4E61E8E35CC}"/>
+                <a16:creationId xmlns:a16="http://schemas.microsoft.com/office/drawing/2014/main" id="{E968CBE9-3363-466E-BF93-B4E61E8E35CC}"/>
               </a:ext>
             </a:extLst>
           </p:cNvPr>
@@ -2896,7 +2914,7 @@
           <p:cNvPr id="4" name="Дата 3">
             <a:extLst>
               <a:ext uri="{FF2B5EF4-FFF2-40B4-BE49-F238E27FC236}">
-                <a16:creationId xmlns:a16="http://schemas.microsoft.com/office/drawing/2014/main" xmlns="" id="{B6E7CCD6-C939-46CD-94EA-C4F16F5B197E}"/>
+                <a16:creationId xmlns:a16="http://schemas.microsoft.com/office/drawing/2014/main" id="{B6E7CCD6-C939-46CD-94EA-C4F16F5B197E}"/>
               </a:ext>
             </a:extLst>
           </p:cNvPr>
@@ -2933,7 +2951,7 @@
             <a:fld id="{9134C4E8-7CCD-4159-9FAF-0E66431A957A}" type="datetimeFigureOut">
               <a:rPr lang="ru-RU" smtClean="0"/>
               <a:pPr/>
-              <a:t>21.01.2022</a:t>
+              <a:t>28.10.2022</a:t>
             </a:fld>
             <a:endParaRPr lang="ru-RU"/>
           </a:p>
@@ -2944,7 +2962,7 @@
           <p:cNvPr id="5" name="Нижний колонтитул 4">
             <a:extLst>
               <a:ext uri="{FF2B5EF4-FFF2-40B4-BE49-F238E27FC236}">
-                <a16:creationId xmlns:a16="http://schemas.microsoft.com/office/drawing/2014/main" xmlns="" id="{89F78FE5-D625-467E-A37F-1A7CCB1AA7E3}"/>
+                <a16:creationId xmlns:a16="http://schemas.microsoft.com/office/drawing/2014/main" id="{89F78FE5-D625-467E-A37F-1A7CCB1AA7E3}"/>
               </a:ext>
             </a:extLst>
           </p:cNvPr>
@@ -2987,7 +3005,7 @@
           <p:cNvPr id="6" name="Номер слайда 5">
             <a:extLst>
               <a:ext uri="{FF2B5EF4-FFF2-40B4-BE49-F238E27FC236}">
-                <a16:creationId xmlns:a16="http://schemas.microsoft.com/office/drawing/2014/main" xmlns="" id="{10D5DE1C-EAA5-4AAC-9EB8-38F5D041F0AF}"/>
+                <a16:creationId xmlns:a16="http://schemas.microsoft.com/office/drawing/2014/main" id="{10D5DE1C-EAA5-4AAC-9EB8-38F5D041F0AF}"/>
               </a:ext>
             </a:extLst>
           </p:cNvPr>
@@ -3033,7 +3051,7 @@
     </p:spTree>
     <p:extLst>
       <p:ext uri="{BB962C8B-B14F-4D97-AF65-F5344CB8AC3E}">
-        <p14:creationId xmlns:p14="http://schemas.microsoft.com/office/powerpoint/2010/main" xmlns="" val="2343577911"/>
+        <p14:creationId xmlns:p14="http://schemas.microsoft.com/office/powerpoint/2010/main" val="2343577911"/>
       </p:ext>
     </p:extLst>
   </p:cSld>
@@ -3356,7 +3374,7 @@
           <p:cNvPr id="2" name="Заголовок 1">
             <a:extLst>
               <a:ext uri="{FF2B5EF4-FFF2-40B4-BE49-F238E27FC236}">
-                <a16:creationId xmlns:a16="http://schemas.microsoft.com/office/drawing/2014/main" xmlns="" id="{1698C2B7-B0FC-49A8-BDF7-774A7B348CC6}"/>
+                <a16:creationId xmlns:a16="http://schemas.microsoft.com/office/drawing/2014/main" id="{1698C2B7-B0FC-49A8-BDF7-774A7B348CC6}"/>
               </a:ext>
             </a:extLst>
           </p:cNvPr>
@@ -3378,10 +3396,6 @@
               <a:rPr lang="ru-RU" dirty="0"/>
               <a:t>Создание игры</a:t>
             </a:r>
-            <a:r>
-              <a:rPr lang="en-US" dirty="0"/>
-              <a:t/>
-            </a:r>
             <a:br>
               <a:rPr lang="en-US" dirty="0"/>
             </a:br>
@@ -3410,7 +3424,7 @@
           <p:cNvPr id="3" name="Подзаголовок 2">
             <a:extLst>
               <a:ext uri="{FF2B5EF4-FFF2-40B4-BE49-F238E27FC236}">
-                <a16:creationId xmlns:a16="http://schemas.microsoft.com/office/drawing/2014/main" xmlns="" id="{857F5C82-A85E-4651-AE76-8223F205615B}"/>
+                <a16:creationId xmlns:a16="http://schemas.microsoft.com/office/drawing/2014/main" id="{857F5C82-A85E-4651-AE76-8223F205615B}"/>
               </a:ext>
             </a:extLst>
           </p:cNvPr>
@@ -3429,13 +3443,13 @@
         </p:spPr>
         <p:txBody>
           <a:bodyPr>
-            <a:normAutofit fontScale="92500"/>
+            <a:normAutofit/>
           </a:bodyPr>
           <a:lstStyle/>
           <a:p>
             <a:r>
               <a:rPr lang="ru-RU" dirty="0"/>
-              <a:t>Выполнили</a:t>
+              <a:t>Выполнил</a:t>
             </a:r>
             <a:r>
               <a:rPr lang="en-US" dirty="0"/>
@@ -3448,19 +3462,18 @@
               <a:rPr lang="ru-RU" dirty="0"/>
               <a:t>Селезнёв Владислав Сергеевич</a:t>
             </a:r>
-          </a:p>
-          <a:p>
-            <a:r>
-              <a:rPr lang="ru-RU" dirty="0"/>
-              <a:t>Алексеев Андрей Викторович</a:t>
-            </a:r>
+            <a:r>
+              <a:rPr lang="en-US" dirty="0"/>
+              <a:t>  11-3</a:t>
+            </a:r>
+            <a:endParaRPr lang="ru-RU" dirty="0"/>
           </a:p>
         </p:txBody>
       </p:sp>
     </p:spTree>
     <p:extLst>
       <p:ext uri="{BB962C8B-B14F-4D97-AF65-F5344CB8AC3E}">
-        <p14:creationId xmlns:p14="http://schemas.microsoft.com/office/powerpoint/2010/main" xmlns="" val="2229672175"/>
+        <p14:creationId xmlns:p14="http://schemas.microsoft.com/office/powerpoint/2010/main" val="2229672175"/>
       </p:ext>
     </p:extLst>
   </p:cSld>
@@ -3492,7 +3505,7 @@
           <p:cNvPr id="2" name="Заголовок 1">
             <a:extLst>
               <a:ext uri="{FF2B5EF4-FFF2-40B4-BE49-F238E27FC236}">
-                <a16:creationId xmlns:a16="http://schemas.microsoft.com/office/drawing/2014/main" xmlns="" id="{D8010B69-A981-4951-991B-5E081512DBA2}"/>
+                <a16:creationId xmlns:a16="http://schemas.microsoft.com/office/drawing/2014/main" id="{D8010B69-A981-4951-991B-5E081512DBA2}"/>
               </a:ext>
             </a:extLst>
           </p:cNvPr>
@@ -3520,7 +3533,7 @@
           <p:cNvPr id="3" name="Объект 2">
             <a:extLst>
               <a:ext uri="{FF2B5EF4-FFF2-40B4-BE49-F238E27FC236}">
-                <a16:creationId xmlns:a16="http://schemas.microsoft.com/office/drawing/2014/main" xmlns="" id="{2C81C5DC-9B41-4062-B256-6BE389061620}"/>
+                <a16:creationId xmlns:a16="http://schemas.microsoft.com/office/drawing/2014/main" id="{2C81C5DC-9B41-4062-B256-6BE389061620}"/>
               </a:ext>
             </a:extLst>
           </p:cNvPr>
@@ -3544,7 +3557,7 @@
           <a:p>
             <a:r>
               <a:rPr lang="ru-RU" dirty="0"/>
-              <a:t>Мы решили воссоздать оригинал популярной игры </a:t>
+              <a:t>Я решил воссоздать оригинал популярной игры </a:t>
             </a:r>
             <a:r>
               <a:rPr lang="en-US" dirty="0"/>
@@ -3576,7 +3589,7 @@
     </p:spTree>
     <p:extLst>
       <p:ext uri="{BB962C8B-B14F-4D97-AF65-F5344CB8AC3E}">
-        <p14:creationId xmlns:p14="http://schemas.microsoft.com/office/powerpoint/2010/main" xmlns="" val="252955759"/>
+        <p14:creationId xmlns:p14="http://schemas.microsoft.com/office/powerpoint/2010/main" val="252955759"/>
       </p:ext>
     </p:extLst>
   </p:cSld>
@@ -3608,7 +3621,7 @@
           <p:cNvPr id="2" name="Заголовок 1">
             <a:extLst>
               <a:ext uri="{FF2B5EF4-FFF2-40B4-BE49-F238E27FC236}">
-                <a16:creationId xmlns:a16="http://schemas.microsoft.com/office/drawing/2014/main" xmlns="" id="{0CE6233F-6646-4D88-8F00-92BCCF6B8D51}"/>
+                <a16:creationId xmlns:a16="http://schemas.microsoft.com/office/drawing/2014/main" id="{0CE6233F-6646-4D88-8F00-92BCCF6B8D51}"/>
               </a:ext>
             </a:extLst>
           </p:cNvPr>
@@ -3636,7 +3649,7 @@
           <p:cNvPr id="3" name="Объект 2">
             <a:extLst>
               <a:ext uri="{FF2B5EF4-FFF2-40B4-BE49-F238E27FC236}">
-                <a16:creationId xmlns:a16="http://schemas.microsoft.com/office/drawing/2014/main" xmlns="" id="{2AB1E6A1-8430-442C-B66B-0980C4563773}"/>
+                <a16:creationId xmlns:a16="http://schemas.microsoft.com/office/drawing/2014/main" id="{2AB1E6A1-8430-442C-B66B-0980C4563773}"/>
               </a:ext>
             </a:extLst>
           </p:cNvPr>
@@ -3712,7 +3725,7 @@
     </p:spTree>
     <p:extLst>
       <p:ext uri="{BB962C8B-B14F-4D97-AF65-F5344CB8AC3E}">
-        <p14:creationId xmlns:p14="http://schemas.microsoft.com/office/powerpoint/2010/main" xmlns="" val="2782680179"/>
+        <p14:creationId xmlns:p14="http://schemas.microsoft.com/office/powerpoint/2010/main" val="2782680179"/>
       </p:ext>
     </p:extLst>
   </p:cSld>
@@ -3749,13 +3762,18 @@
             <p:ph type="title"/>
           </p:nvPr>
         </p:nvSpPr>
-        <p:spPr/>
-        <p:txBody>
-          <a:bodyPr/>
-          <a:lstStyle/>
-          <a:p>
-            <a:r>
-              <a:rPr lang="en-US" dirty="0" smtClean="0"/>
+        <p:spPr>
+          <a:xfrm>
+            <a:off x="838200" y="134305"/>
+            <a:ext cx="10515600" cy="1325563"/>
+          </a:xfrm>
+        </p:spPr>
+        <p:txBody>
+          <a:bodyPr/>
+          <a:lstStyle/>
+          <a:p>
+            <a:r>
+              <a:rPr lang="en-US" dirty="0"/>
               <a:t>main.py</a:t>
             </a:r>
             <a:endParaRPr lang="ru-RU" dirty="0"/>
@@ -3772,25 +3790,30 @@
             <p:ph idx="1"/>
           </p:nvPr>
         </p:nvSpPr>
-        <p:spPr/>
-        <p:txBody>
-          <a:bodyPr/>
-          <a:lstStyle/>
-          <a:p>
-            <a:r>
-              <a:rPr lang="en-US" dirty="0" err="1" smtClean="0"/>
+        <p:spPr>
+          <a:xfrm>
+            <a:off x="838200" y="1253331"/>
+            <a:ext cx="10515600" cy="4351338"/>
+          </a:xfrm>
+        </p:spPr>
+        <p:txBody>
+          <a:bodyPr/>
+          <a:lstStyle/>
+          <a:p>
+            <a:r>
+              <a:rPr lang="en-US" dirty="0" err="1"/>
               <a:t>MainMenu</a:t>
             </a:r>
             <a:r>
-              <a:rPr lang="ru-RU" dirty="0" smtClean="0"/>
+              <a:rPr lang="ru-RU" dirty="0"/>
               <a:t> – класс, который создаёт главный экран с выбором что делать дальше: играть по сети, играть на одном </a:t>
             </a:r>
             <a:r>
-              <a:rPr lang="ru-RU" dirty="0" err="1" smtClean="0"/>
+              <a:rPr lang="ru-RU" dirty="0" err="1"/>
               <a:t>пк</a:t>
             </a:r>
             <a:r>
-              <a:rPr lang="ru-RU" dirty="0" smtClean="0"/>
+              <a:rPr lang="ru-RU" dirty="0"/>
               <a:t>, редактор карт</a:t>
             </a:r>
           </a:p>
@@ -3798,13 +3821,73 @@
             <a:pPr>
               <a:buNone/>
             </a:pPr>
-            <a:endParaRPr lang="ru-RU" dirty="0" smtClean="0"/>
-          </a:p>
-          <a:p>
             <a:endParaRPr lang="ru-RU" dirty="0"/>
           </a:p>
-        </p:txBody>
-      </p:sp>
+          <a:p>
+            <a:endParaRPr lang="ru-RU" dirty="0"/>
+          </a:p>
+        </p:txBody>
+      </p:sp>
+      <p:pic>
+        <p:nvPicPr>
+          <p:cNvPr id="5" name="Рисунок 4">
+            <a:extLst>
+              <a:ext uri="{FF2B5EF4-FFF2-40B4-BE49-F238E27FC236}">
+                <a16:creationId xmlns:a16="http://schemas.microsoft.com/office/drawing/2014/main" id="{F73175DE-D2CA-42DB-9456-1F981024EDE9}"/>
+              </a:ext>
+            </a:extLst>
+          </p:cNvPr>
+          <p:cNvPicPr>
+            <a:picLocks noChangeAspect="1"/>
+          </p:cNvPicPr>
+          <p:nvPr/>
+        </p:nvPicPr>
+        <p:blipFill>
+          <a:blip r:embed="rId2"/>
+          <a:stretch>
+            <a:fillRect/>
+          </a:stretch>
+        </p:blipFill>
+        <p:spPr>
+          <a:xfrm>
+            <a:off x="349011" y="2260770"/>
+            <a:ext cx="4578096" cy="4214350"/>
+          </a:xfrm>
+          <a:prstGeom prst="rect">
+            <a:avLst/>
+          </a:prstGeom>
+        </p:spPr>
+      </p:pic>
+      <p:pic>
+        <p:nvPicPr>
+          <p:cNvPr id="7" name="Рисунок 6">
+            <a:extLst>
+              <a:ext uri="{FF2B5EF4-FFF2-40B4-BE49-F238E27FC236}">
+                <a16:creationId xmlns:a16="http://schemas.microsoft.com/office/drawing/2014/main" id="{987512B0-9F34-4144-A97B-DA6A1AA97C50}"/>
+              </a:ext>
+            </a:extLst>
+          </p:cNvPr>
+          <p:cNvPicPr>
+            <a:picLocks noChangeAspect="1"/>
+          </p:cNvPicPr>
+          <p:nvPr/>
+        </p:nvPicPr>
+        <p:blipFill>
+          <a:blip r:embed="rId3"/>
+          <a:stretch>
+            <a:fillRect/>
+          </a:stretch>
+        </p:blipFill>
+        <p:spPr>
+          <a:xfrm>
+            <a:off x="5700383" y="2104008"/>
+            <a:ext cx="4554398" cy="4478783"/>
+          </a:xfrm>
+          <a:prstGeom prst="rect">
+            <a:avLst/>
+          </a:prstGeom>
+        </p:spPr>
+      </p:pic>
     </p:spTree>
   </p:cSld>
   <p:clrMapOvr>
@@ -3840,18 +3923,19 @@
             <p:ph type="title"/>
           </p:nvPr>
         </p:nvSpPr>
-        <p:spPr/>
-        <p:txBody>
-          <a:bodyPr/>
-          <a:lstStyle/>
-          <a:p>
-            <a:r>
-              <a:rPr lang="en-US" dirty="0" smtClean="0"/>
-              <a:t>g</a:t>
-            </a:r>
-            <a:r>
-              <a:rPr lang="en-US" dirty="0" smtClean="0"/>
-              <a:t>ame.py</a:t>
+        <p:spPr>
+          <a:xfrm>
+            <a:off x="234518" y="72162"/>
+            <a:ext cx="2641847" cy="1325563"/>
+          </a:xfrm>
+        </p:spPr>
+        <p:txBody>
+          <a:bodyPr/>
+          <a:lstStyle/>
+          <a:p>
+            <a:r>
+              <a:rPr lang="en-US" dirty="0"/>
+              <a:t>game.py</a:t>
             </a:r>
             <a:endParaRPr lang="ru-RU" dirty="0"/>
           </a:p>
@@ -3867,123 +3951,179 @@
             <p:ph idx="1"/>
           </p:nvPr>
         </p:nvSpPr>
-        <p:spPr/>
-        <p:txBody>
-          <a:bodyPr/>
-          <a:lstStyle/>
-          <a:p>
-            <a:r>
-              <a:rPr lang="en-US" dirty="0" smtClean="0"/>
+        <p:spPr>
+          <a:xfrm>
+            <a:off x="2667002" y="183256"/>
+            <a:ext cx="4870142" cy="2693109"/>
+          </a:xfrm>
+        </p:spPr>
+        <p:txBody>
+          <a:bodyPr>
+            <a:normAutofit/>
+          </a:bodyPr>
+          <a:lstStyle/>
+          <a:p>
+            <a:r>
+              <a:rPr lang="en-US" sz="1400" dirty="0"/>
               <a:t>Game – </a:t>
             </a:r>
             <a:r>
-              <a:rPr lang="ru-RU" dirty="0" smtClean="0"/>
+              <a:rPr lang="ru-RU" sz="1400" dirty="0"/>
               <a:t>класс с реализацией игры</a:t>
             </a:r>
           </a:p>
           <a:p>
             <a:r>
-              <a:rPr lang="en-US" dirty="0" smtClean="0"/>
+              <a:rPr lang="en-US" sz="1400" dirty="0"/>
               <a:t>Liquids</a:t>
             </a:r>
             <a:r>
-              <a:rPr lang="ru-RU" dirty="0" smtClean="0"/>
-              <a:t> </a:t>
-            </a:r>
-            <a:r>
-              <a:rPr lang="ru-RU" dirty="0" smtClean="0"/>
-              <a:t>- класс для реализации ликвидирующих объектов</a:t>
-            </a:r>
-          </a:p>
-          <a:p>
-            <a:r>
-              <a:rPr lang="ru-RU" dirty="0" smtClean="0"/>
-              <a:t> </a:t>
-            </a:r>
-            <a:r>
-              <a:rPr lang="en-US" dirty="0" smtClean="0"/>
+              <a:rPr lang="ru-RU" sz="1400" dirty="0"/>
+              <a:t> - класс для реализации ликвидирующих объектов</a:t>
+            </a:r>
+          </a:p>
+          <a:p>
+            <a:r>
+              <a:rPr lang="en-US" sz="1400" dirty="0"/>
               <a:t>Button</a:t>
             </a:r>
             <a:r>
-              <a:rPr lang="ru-RU" dirty="0" smtClean="0"/>
-              <a:t> – класс для </a:t>
-            </a:r>
-            <a:r>
-              <a:rPr lang="ru-RU" dirty="0" smtClean="0"/>
-              <a:t>реализации а</a:t>
-            </a:r>
-            <a:r>
-              <a:rPr lang="ru-RU" dirty="0" smtClean="0"/>
-              <a:t>ктивирующей кнопки</a:t>
-            </a:r>
-          </a:p>
-          <a:p>
-            <a:r>
-              <a:rPr lang="en-US" dirty="0" smtClean="0"/>
+              <a:rPr lang="ru-RU" sz="1400" dirty="0"/>
+              <a:t> – класс для реализации активирующей кнопки</a:t>
+            </a:r>
+          </a:p>
+          <a:p>
+            <a:r>
+              <a:rPr lang="en-US" sz="1400" dirty="0"/>
               <a:t>Barrier</a:t>
             </a:r>
             <a:r>
-              <a:rPr lang="ru-RU" dirty="0" smtClean="0"/>
-              <a:t> - </a:t>
-            </a:r>
-            <a:r>
-              <a:rPr lang="ru-RU" dirty="0" smtClean="0"/>
-              <a:t>класс для </a:t>
-            </a:r>
-            <a:r>
-              <a:rPr lang="ru-RU" dirty="0" smtClean="0"/>
-              <a:t>реализации барьера, активирующегося кнопкой</a:t>
-            </a:r>
-          </a:p>
-          <a:p>
-            <a:r>
-              <a:rPr lang="en-US" dirty="0" smtClean="0"/>
+              <a:rPr lang="ru-RU" sz="1400" dirty="0"/>
+              <a:t> - класс для реализации барьера, активирующегося кнопкой</a:t>
+            </a:r>
+          </a:p>
+          <a:p>
+            <a:r>
+              <a:rPr lang="en-US" sz="1400" dirty="0"/>
               <a:t>Box</a:t>
             </a:r>
             <a:r>
-              <a:rPr lang="ru-RU" dirty="0" smtClean="0"/>
-              <a:t> – класс </a:t>
-            </a:r>
-            <a:r>
-              <a:rPr lang="ru-RU" dirty="0" smtClean="0"/>
-              <a:t>для реализации </a:t>
-            </a:r>
-            <a:r>
-              <a:rPr lang="ru-RU" dirty="0" smtClean="0"/>
-              <a:t>коробки</a:t>
-            </a:r>
-          </a:p>
-          <a:p>
-            <a:r>
-              <a:rPr lang="en-US" dirty="0" smtClean="0"/>
+              <a:rPr lang="ru-RU" sz="1400" dirty="0"/>
+              <a:t> – класс для реализации коробки</a:t>
+            </a:r>
+          </a:p>
+          <a:p>
+            <a:r>
+              <a:rPr lang="en-US" sz="1400" dirty="0"/>
               <a:t>Platform</a:t>
             </a:r>
             <a:r>
-              <a:rPr lang="ru-RU" dirty="0" smtClean="0"/>
-              <a:t> – </a:t>
-            </a:r>
-            <a:r>
-              <a:rPr lang="ru-RU" dirty="0" smtClean="0"/>
-              <a:t>класс для реализации </a:t>
-            </a:r>
-            <a:r>
-              <a:rPr lang="ru-RU" dirty="0" smtClean="0"/>
-              <a:t>платформы</a:t>
-            </a:r>
-          </a:p>
-          <a:p>
-            <a:r>
-              <a:rPr lang="en-US" dirty="0" smtClean="0"/>
+              <a:rPr lang="ru-RU" sz="1400" dirty="0"/>
+              <a:t> – класс для реализации платформы</a:t>
+            </a:r>
+          </a:p>
+          <a:p>
+            <a:r>
+              <a:rPr lang="en-US" sz="1400" dirty="0"/>
               <a:t>Heroes</a:t>
             </a:r>
             <a:r>
-              <a:rPr lang="ru-RU" dirty="0" smtClean="0"/>
+              <a:rPr lang="ru-RU" sz="1400" dirty="0"/>
               <a:t> – класс для реализации героев</a:t>
             </a:r>
-            <a:endParaRPr lang="ru-RU" dirty="0"/>
-          </a:p>
-        </p:txBody>
-      </p:sp>
+          </a:p>
+        </p:txBody>
+      </p:sp>
+      <p:pic>
+        <p:nvPicPr>
+          <p:cNvPr id="5" name="Рисунок 4">
+            <a:extLst>
+              <a:ext uri="{FF2B5EF4-FFF2-40B4-BE49-F238E27FC236}">
+                <a16:creationId xmlns:a16="http://schemas.microsoft.com/office/drawing/2014/main" id="{35F61C95-7E53-4260-8E43-D6DF78F78CE6}"/>
+              </a:ext>
+            </a:extLst>
+          </p:cNvPr>
+          <p:cNvPicPr>
+            <a:picLocks noChangeAspect="1"/>
+          </p:cNvPicPr>
+          <p:nvPr/>
+        </p:nvPicPr>
+        <p:blipFill>
+          <a:blip r:embed="rId2"/>
+          <a:stretch>
+            <a:fillRect/>
+          </a:stretch>
+        </p:blipFill>
+        <p:spPr>
+          <a:xfrm>
+            <a:off x="-3096286" y="2803937"/>
+            <a:ext cx="6995776" cy="3719341"/>
+          </a:xfrm>
+          <a:prstGeom prst="rect">
+            <a:avLst/>
+          </a:prstGeom>
+        </p:spPr>
+      </p:pic>
+      <p:pic>
+        <p:nvPicPr>
+          <p:cNvPr id="7" name="Рисунок 6">
+            <a:extLst>
+              <a:ext uri="{FF2B5EF4-FFF2-40B4-BE49-F238E27FC236}">
+                <a16:creationId xmlns:a16="http://schemas.microsoft.com/office/drawing/2014/main" id="{672108FB-2A19-4219-8994-1B01856669E9}"/>
+              </a:ext>
+            </a:extLst>
+          </p:cNvPr>
+          <p:cNvPicPr>
+            <a:picLocks noChangeAspect="1"/>
+          </p:cNvPicPr>
+          <p:nvPr/>
+        </p:nvPicPr>
+        <p:blipFill>
+          <a:blip r:embed="rId3"/>
+          <a:stretch>
+            <a:fillRect/>
+          </a:stretch>
+        </p:blipFill>
+        <p:spPr>
+          <a:xfrm>
+            <a:off x="3899490" y="2803937"/>
+            <a:ext cx="3430806" cy="4387832"/>
+          </a:xfrm>
+          <a:prstGeom prst="rect">
+            <a:avLst/>
+          </a:prstGeom>
+        </p:spPr>
+      </p:pic>
+      <p:pic>
+        <p:nvPicPr>
+          <p:cNvPr id="9" name="Рисунок 8">
+            <a:extLst>
+              <a:ext uri="{FF2B5EF4-FFF2-40B4-BE49-F238E27FC236}">
+                <a16:creationId xmlns:a16="http://schemas.microsoft.com/office/drawing/2014/main" id="{6F9BA4B7-728D-451D-8015-0E62DD26729D}"/>
+              </a:ext>
+            </a:extLst>
+          </p:cNvPr>
+          <p:cNvPicPr>
+            <a:picLocks noChangeAspect="1"/>
+          </p:cNvPicPr>
+          <p:nvPr/>
+        </p:nvPicPr>
+        <p:blipFill>
+          <a:blip r:embed="rId4"/>
+          <a:stretch>
+            <a:fillRect/>
+          </a:stretch>
+        </p:blipFill>
+        <p:spPr>
+          <a:xfrm>
+            <a:off x="7344596" y="636134"/>
+            <a:ext cx="4423383" cy="5585732"/>
+          </a:xfrm>
+          <a:prstGeom prst="rect">
+            <a:avLst/>
+          </a:prstGeom>
+        </p:spPr>
+      </p:pic>
     </p:spTree>
   </p:cSld>
   <p:clrMapOvr>
@@ -4019,13 +4159,18 @@
             <p:ph type="title"/>
           </p:nvPr>
         </p:nvSpPr>
-        <p:spPr/>
-        <p:txBody>
-          <a:bodyPr/>
-          <a:lstStyle/>
-          <a:p>
-            <a:r>
-              <a:rPr lang="en-US" dirty="0" smtClean="0"/>
+        <p:spPr>
+          <a:xfrm>
+            <a:off x="136864" y="76944"/>
+            <a:ext cx="10515600" cy="1325563"/>
+          </a:xfrm>
+        </p:spPr>
+        <p:txBody>
+          <a:bodyPr/>
+          <a:lstStyle/>
+          <a:p>
+            <a:r>
+              <a:rPr lang="en-US" dirty="0"/>
               <a:t>creating_levels.py</a:t>
             </a:r>
             <a:endParaRPr lang="ru-RU" dirty="0"/>
@@ -4042,23 +4187,87 @@
             <p:ph idx="1"/>
           </p:nvPr>
         </p:nvSpPr>
-        <p:spPr/>
-        <p:txBody>
-          <a:bodyPr/>
-          <a:lstStyle/>
-          <a:p>
-            <a:r>
-              <a:rPr lang="en-US" dirty="0" smtClean="0"/>
+        <p:spPr>
+          <a:xfrm>
+            <a:off x="136864" y="1402507"/>
+            <a:ext cx="10515600" cy="4351338"/>
+          </a:xfrm>
+        </p:spPr>
+        <p:txBody>
+          <a:bodyPr/>
+          <a:lstStyle/>
+          <a:p>
+            <a:r>
+              <a:rPr lang="en-US" dirty="0"/>
               <a:t>Level</a:t>
             </a:r>
             <a:r>
-              <a:rPr lang="ru-RU" dirty="0" smtClean="0"/>
+              <a:rPr lang="ru-RU" dirty="0"/>
               <a:t> – реализация редактора в целом</a:t>
             </a:r>
-            <a:endParaRPr lang="ru-RU" dirty="0"/>
-          </a:p>
-        </p:txBody>
-      </p:sp>
+          </a:p>
+        </p:txBody>
+      </p:sp>
+      <p:pic>
+        <p:nvPicPr>
+          <p:cNvPr id="5" name="Рисунок 4">
+            <a:extLst>
+              <a:ext uri="{FF2B5EF4-FFF2-40B4-BE49-F238E27FC236}">
+                <a16:creationId xmlns:a16="http://schemas.microsoft.com/office/drawing/2014/main" id="{4870634D-CABD-4B23-B5C7-01F26E923545}"/>
+              </a:ext>
+            </a:extLst>
+          </p:cNvPr>
+          <p:cNvPicPr>
+            <a:picLocks noChangeAspect="1"/>
+          </p:cNvPicPr>
+          <p:nvPr/>
+        </p:nvPicPr>
+        <p:blipFill>
+          <a:blip r:embed="rId2"/>
+          <a:stretch>
+            <a:fillRect/>
+          </a:stretch>
+        </p:blipFill>
+        <p:spPr>
+          <a:xfrm>
+            <a:off x="6732902" y="935478"/>
+            <a:ext cx="4686131" cy="4728476"/>
+          </a:xfrm>
+          <a:prstGeom prst="rect">
+            <a:avLst/>
+          </a:prstGeom>
+        </p:spPr>
+      </p:pic>
+      <p:pic>
+        <p:nvPicPr>
+          <p:cNvPr id="7" name="Рисунок 6">
+            <a:extLst>
+              <a:ext uri="{FF2B5EF4-FFF2-40B4-BE49-F238E27FC236}">
+                <a16:creationId xmlns:a16="http://schemas.microsoft.com/office/drawing/2014/main" id="{3934135D-0DB1-4DFF-B816-94E3FE8AC819}"/>
+              </a:ext>
+            </a:extLst>
+          </p:cNvPr>
+          <p:cNvPicPr>
+            <a:picLocks noChangeAspect="1"/>
+          </p:cNvPicPr>
+          <p:nvPr/>
+        </p:nvPicPr>
+        <p:blipFill>
+          <a:blip r:embed="rId3"/>
+          <a:stretch>
+            <a:fillRect/>
+          </a:stretch>
+        </p:blipFill>
+        <p:spPr>
+          <a:xfrm>
+            <a:off x="650481" y="2007271"/>
+            <a:ext cx="5040105" cy="4489073"/>
+          </a:xfrm>
+          <a:prstGeom prst="rect">
+            <a:avLst/>
+          </a:prstGeom>
+        </p:spPr>
+      </p:pic>
     </p:spTree>
   </p:cSld>
   <p:clrMapOvr>
@@ -4089,7 +4298,7 @@
           <p:cNvPr id="2" name="Заголовок 1">
             <a:extLst>
               <a:ext uri="{FF2B5EF4-FFF2-40B4-BE49-F238E27FC236}">
-                <a16:creationId xmlns:a16="http://schemas.microsoft.com/office/drawing/2014/main" xmlns="" id="{5E01463B-849D-4DA1-A190-19AF2D932E97}"/>
+                <a16:creationId xmlns:a16="http://schemas.microsoft.com/office/drawing/2014/main" id="{0ED942DF-631B-4FDE-A34E-F4B56A217790}"/>
               </a:ext>
             </a:extLst>
           </p:cNvPr>
@@ -4105,10 +4314,7 @@
           <a:bodyPr/>
           <a:lstStyle/>
           <a:p>
-            <a:r>
-              <a:rPr lang="ru-RU" dirty="0"/>
-              <a:t>Вывод</a:t>
-            </a:r>
+            <a:endParaRPr lang="ru-RU" dirty="0"/>
           </a:p>
         </p:txBody>
       </p:sp>
@@ -4117,7 +4323,7 @@
           <p:cNvPr id="3" name="Объект 2">
             <a:extLst>
               <a:ext uri="{FF2B5EF4-FFF2-40B4-BE49-F238E27FC236}">
-                <a16:creationId xmlns:a16="http://schemas.microsoft.com/office/drawing/2014/main" xmlns="" id="{2D983470-276E-42C3-A87A-551B5177A921}"/>
+                <a16:creationId xmlns:a16="http://schemas.microsoft.com/office/drawing/2014/main" id="{864B2799-71B6-43B0-8FA0-FEB38E891008}"/>
               </a:ext>
             </a:extLst>
           </p:cNvPr>
@@ -4133,61 +4339,416 @@
           <a:bodyPr/>
           <a:lstStyle/>
           <a:p>
-            <a:r>
-              <a:rPr lang="ru-RU" dirty="0"/>
-              <a:t>У нас получилось воссоздать задуманное. Программа полностью работоспособна</a:t>
-            </a:r>
-            <a:r>
-              <a:rPr lang="en-US" dirty="0"/>
-              <a:t>, </a:t>
-            </a:r>
-            <a:r>
-              <a:rPr lang="ru-RU" dirty="0"/>
-              <a:t>имеет большой функционал.</a:t>
-            </a:r>
-          </a:p>
-          <a:p>
-            <a:r>
-              <a:rPr lang="ru-RU" dirty="0"/>
-              <a:t>В будущем можно доработать программу</a:t>
-            </a:r>
-            <a:r>
-              <a:rPr lang="en-US" dirty="0"/>
-              <a:t>: </a:t>
-            </a:r>
-            <a:endParaRPr lang="ru-RU" dirty="0" smtClean="0"/>
-          </a:p>
-          <a:p>
-            <a:r>
-              <a:rPr lang="ru-RU" dirty="0" smtClean="0"/>
-              <a:t>Сделать разные цвета для объектов</a:t>
-            </a:r>
-          </a:p>
-          <a:p>
-            <a:r>
-              <a:rPr lang="ru-RU" dirty="0" smtClean="0"/>
-              <a:t>Создание новых уровней</a:t>
-            </a:r>
-          </a:p>
-          <a:p>
-            <a:r>
-              <a:rPr lang="ru-RU" smtClean="0"/>
-              <a:t>Дополнительные объекты</a:t>
-            </a:r>
-            <a:endParaRPr lang="en-US" dirty="0"/>
-          </a:p>
-          <a:p>
             <a:endParaRPr lang="ru-RU" dirty="0"/>
           </a:p>
-          <a:p>
-            <a:endParaRPr lang="ru-RU" dirty="0"/>
-          </a:p>
-        </p:txBody>
-      </p:sp>
+        </p:txBody>
+      </p:sp>
+      <p:pic>
+        <p:nvPicPr>
+          <p:cNvPr id="5" name="Рисунок 4">
+            <a:extLst>
+              <a:ext uri="{FF2B5EF4-FFF2-40B4-BE49-F238E27FC236}">
+                <a16:creationId xmlns:a16="http://schemas.microsoft.com/office/drawing/2014/main" id="{A828587F-50BC-4805-B8C2-14E9473E9A43}"/>
+              </a:ext>
+            </a:extLst>
+          </p:cNvPr>
+          <p:cNvPicPr>
+            <a:picLocks noChangeAspect="1"/>
+          </p:cNvPicPr>
+          <p:nvPr/>
+        </p:nvPicPr>
+        <p:blipFill>
+          <a:blip r:embed="rId2"/>
+          <a:stretch>
+            <a:fillRect/>
+          </a:stretch>
+        </p:blipFill>
+        <p:spPr>
+          <a:xfrm>
+            <a:off x="108176" y="68637"/>
+            <a:ext cx="4161983" cy="3599330"/>
+          </a:xfrm>
+          <a:prstGeom prst="rect">
+            <a:avLst/>
+          </a:prstGeom>
+        </p:spPr>
+      </p:pic>
+      <p:pic>
+        <p:nvPicPr>
+          <p:cNvPr id="7" name="Рисунок 6">
+            <a:extLst>
+              <a:ext uri="{FF2B5EF4-FFF2-40B4-BE49-F238E27FC236}">
+                <a16:creationId xmlns:a16="http://schemas.microsoft.com/office/drawing/2014/main" id="{50C374D1-3B79-442E-A2DA-20E84A83BF32}"/>
+              </a:ext>
+            </a:extLst>
+          </p:cNvPr>
+          <p:cNvPicPr>
+            <a:picLocks noChangeAspect="1"/>
+          </p:cNvPicPr>
+          <p:nvPr/>
+        </p:nvPicPr>
+        <p:blipFill>
+          <a:blip r:embed="rId3"/>
+          <a:stretch>
+            <a:fillRect/>
+          </a:stretch>
+        </p:blipFill>
+        <p:spPr>
+          <a:xfrm>
+            <a:off x="4406145" y="31205"/>
+            <a:ext cx="4039568" cy="3517942"/>
+          </a:xfrm>
+          <a:prstGeom prst="rect">
+            <a:avLst/>
+          </a:prstGeom>
+        </p:spPr>
+      </p:pic>
+      <p:pic>
+        <p:nvPicPr>
+          <p:cNvPr id="9" name="Рисунок 8">
+            <a:extLst>
+              <a:ext uri="{FF2B5EF4-FFF2-40B4-BE49-F238E27FC236}">
+                <a16:creationId xmlns:a16="http://schemas.microsoft.com/office/drawing/2014/main" id="{4D910EB6-71F9-434B-B085-B011314CAB54}"/>
+              </a:ext>
+            </a:extLst>
+          </p:cNvPr>
+          <p:cNvPicPr>
+            <a:picLocks noChangeAspect="1"/>
+          </p:cNvPicPr>
+          <p:nvPr/>
+        </p:nvPicPr>
+        <p:blipFill>
+          <a:blip r:embed="rId4"/>
+          <a:stretch>
+            <a:fillRect/>
+          </a:stretch>
+        </p:blipFill>
+        <p:spPr>
+          <a:xfrm>
+            <a:off x="187720" y="3575560"/>
+            <a:ext cx="3682944" cy="3213803"/>
+          </a:xfrm>
+          <a:prstGeom prst="rect">
+            <a:avLst/>
+          </a:prstGeom>
+        </p:spPr>
+      </p:pic>
+      <p:pic>
+        <p:nvPicPr>
+          <p:cNvPr id="11" name="Рисунок 10">
+            <a:extLst>
+              <a:ext uri="{FF2B5EF4-FFF2-40B4-BE49-F238E27FC236}">
+                <a16:creationId xmlns:a16="http://schemas.microsoft.com/office/drawing/2014/main" id="{F753507A-958F-492D-A1D5-51662F71AEE0}"/>
+              </a:ext>
+            </a:extLst>
+          </p:cNvPr>
+          <p:cNvPicPr>
+            <a:picLocks noChangeAspect="1"/>
+          </p:cNvPicPr>
+          <p:nvPr/>
+        </p:nvPicPr>
+        <p:blipFill>
+          <a:blip r:embed="rId5"/>
+          <a:stretch>
+            <a:fillRect/>
+          </a:stretch>
+        </p:blipFill>
+        <p:spPr>
+          <a:xfrm>
+            <a:off x="4372939" y="3510359"/>
+            <a:ext cx="3762488" cy="3266627"/>
+          </a:xfrm>
+          <a:prstGeom prst="rect">
+            <a:avLst/>
+          </a:prstGeom>
+        </p:spPr>
+      </p:pic>
+      <p:pic>
+        <p:nvPicPr>
+          <p:cNvPr id="13" name="Рисунок 12">
+            <a:extLst>
+              <a:ext uri="{FF2B5EF4-FFF2-40B4-BE49-F238E27FC236}">
+                <a16:creationId xmlns:a16="http://schemas.microsoft.com/office/drawing/2014/main" id="{0F4166CB-ACFA-4076-BC31-CA37FDB58525}"/>
+              </a:ext>
+            </a:extLst>
+          </p:cNvPr>
+          <p:cNvPicPr>
+            <a:picLocks noChangeAspect="1"/>
+          </p:cNvPicPr>
+          <p:nvPr/>
+        </p:nvPicPr>
+        <p:blipFill>
+          <a:blip r:embed="rId6"/>
+          <a:stretch>
+            <a:fillRect/>
+          </a:stretch>
+        </p:blipFill>
+        <p:spPr>
+          <a:xfrm>
+            <a:off x="8168633" y="365125"/>
+            <a:ext cx="4038255" cy="4122414"/>
+          </a:xfrm>
+          <a:prstGeom prst="rect">
+            <a:avLst/>
+          </a:prstGeom>
+        </p:spPr>
+      </p:pic>
+      <p:pic>
+        <p:nvPicPr>
+          <p:cNvPr id="15" name="Рисунок 14">
+            <a:extLst>
+              <a:ext uri="{FF2B5EF4-FFF2-40B4-BE49-F238E27FC236}">
+                <a16:creationId xmlns:a16="http://schemas.microsoft.com/office/drawing/2014/main" id="{CA905FFA-2C72-4365-816D-06171FCABD7B}"/>
+              </a:ext>
+            </a:extLst>
+          </p:cNvPr>
+          <p:cNvPicPr>
+            <a:picLocks noChangeAspect="1"/>
+          </p:cNvPicPr>
+          <p:nvPr/>
+        </p:nvPicPr>
+        <p:blipFill>
+          <a:blip r:embed="rId7"/>
+          <a:stretch>
+            <a:fillRect/>
+          </a:stretch>
+        </p:blipFill>
+        <p:spPr>
+          <a:xfrm>
+            <a:off x="8238207" y="4663443"/>
+            <a:ext cx="3842957" cy="1829432"/>
+          </a:xfrm>
+          <a:prstGeom prst="rect">
+            <a:avLst/>
+          </a:prstGeom>
+        </p:spPr>
+      </p:pic>
     </p:spTree>
     <p:extLst>
       <p:ext uri="{BB962C8B-B14F-4D97-AF65-F5344CB8AC3E}">
-        <p14:creationId xmlns:p14="http://schemas.microsoft.com/office/powerpoint/2010/main" xmlns="" val="1524200507"/>
+        <p14:creationId xmlns:p14="http://schemas.microsoft.com/office/powerpoint/2010/main" val="6183149"/>
+      </p:ext>
+    </p:extLst>
+  </p:cSld>
+  <p:clrMapOvr>
+    <a:masterClrMapping/>
+  </p:clrMapOvr>
+</p:sld>
+</file>
+
+<file path=ppt/slides/slide8.xml><?xml version="1.0" encoding="utf-8"?>
+<p:sld xmlns:a="http://schemas.openxmlformats.org/drawingml/2006/main" xmlns:r="http://schemas.openxmlformats.org/officeDocument/2006/relationships" xmlns:p="http://schemas.openxmlformats.org/presentationml/2006/main">
+  <p:cSld>
+    <p:spTree>
+      <p:nvGrpSpPr>
+        <p:cNvPr id="1" name=""/>
+        <p:cNvGrpSpPr/>
+        <p:nvPr/>
+      </p:nvGrpSpPr>
+      <p:grpSpPr>
+        <a:xfrm>
+          <a:off x="0" y="0"/>
+          <a:ext cx="0" cy="0"/>
+          <a:chOff x="0" y="0"/>
+          <a:chExt cx="0" cy="0"/>
+        </a:xfrm>
+      </p:grpSpPr>
+      <p:sp>
+        <p:nvSpPr>
+          <p:cNvPr id="2" name="Заголовок 1">
+            <a:extLst>
+              <a:ext uri="{FF2B5EF4-FFF2-40B4-BE49-F238E27FC236}">
+                <a16:creationId xmlns:a16="http://schemas.microsoft.com/office/drawing/2014/main" id="{0BFEEFE4-4FCB-49B3-A651-BE38F1E592D3}"/>
+              </a:ext>
+            </a:extLst>
+          </p:cNvPr>
+          <p:cNvSpPr>
+            <a:spLocks noGrp="1"/>
+          </p:cNvSpPr>
+          <p:nvPr>
+            <p:ph type="title"/>
+          </p:nvPr>
+        </p:nvSpPr>
+        <p:spPr>
+          <a:xfrm>
+            <a:off x="838200" y="365126"/>
+            <a:ext cx="8003959" cy="957648"/>
+          </a:xfrm>
+        </p:spPr>
+        <p:txBody>
+          <a:bodyPr>
+            <a:normAutofit fontScale="90000"/>
+          </a:bodyPr>
+          <a:lstStyle/>
+          <a:p>
+            <a:r>
+              <a:rPr lang="en-US" dirty="0"/>
+              <a:t>github.com/cheeeeel/fire-and-water</a:t>
+            </a:r>
+            <a:endParaRPr lang="ru-RU" dirty="0"/>
+          </a:p>
+        </p:txBody>
+      </p:sp>
+      <p:pic>
+        <p:nvPicPr>
+          <p:cNvPr id="7" name="Объект 6">
+            <a:extLst>
+              <a:ext uri="{FF2B5EF4-FFF2-40B4-BE49-F238E27FC236}">
+                <a16:creationId xmlns:a16="http://schemas.microsoft.com/office/drawing/2014/main" id="{89C44E5A-46E4-431D-BEAF-56487D4F2142}"/>
+              </a:ext>
+            </a:extLst>
+          </p:cNvPr>
+          <p:cNvPicPr>
+            <a:picLocks noGrp="1" noChangeAspect="1"/>
+          </p:cNvPicPr>
+          <p:nvPr>
+            <p:ph idx="1"/>
+          </p:nvPr>
+        </p:nvPicPr>
+        <p:blipFill>
+          <a:blip r:embed="rId2"/>
+          <a:stretch>
+            <a:fillRect/>
+          </a:stretch>
+        </p:blipFill>
+        <p:spPr>
+          <a:xfrm>
+            <a:off x="89377" y="1396013"/>
+            <a:ext cx="8003959" cy="5096861"/>
+          </a:xfrm>
+        </p:spPr>
+      </p:pic>
+      <p:pic>
+        <p:nvPicPr>
+          <p:cNvPr id="9" name="Рисунок 8">
+            <a:extLst>
+              <a:ext uri="{FF2B5EF4-FFF2-40B4-BE49-F238E27FC236}">
+                <a16:creationId xmlns:a16="http://schemas.microsoft.com/office/drawing/2014/main" id="{D1DA78AF-331A-4BDF-B687-9168B5CA42B5}"/>
+              </a:ext>
+            </a:extLst>
+          </p:cNvPr>
+          <p:cNvPicPr>
+            <a:picLocks noChangeAspect="1"/>
+          </p:cNvPicPr>
+          <p:nvPr/>
+        </p:nvPicPr>
+        <p:blipFill>
+          <a:blip r:embed="rId3"/>
+          <a:stretch>
+            <a:fillRect/>
+          </a:stretch>
+        </p:blipFill>
+        <p:spPr>
+          <a:xfrm>
+            <a:off x="8560473" y="1216964"/>
+            <a:ext cx="3470617" cy="5024037"/>
+          </a:xfrm>
+          <a:prstGeom prst="rect">
+            <a:avLst/>
+          </a:prstGeom>
+        </p:spPr>
+      </p:pic>
+    </p:spTree>
+    <p:extLst>
+      <p:ext uri="{BB962C8B-B14F-4D97-AF65-F5344CB8AC3E}">
+        <p14:creationId xmlns:p14="http://schemas.microsoft.com/office/powerpoint/2010/main" val="2796676647"/>
+      </p:ext>
+    </p:extLst>
+  </p:cSld>
+  <p:clrMapOvr>
+    <a:masterClrMapping/>
+  </p:clrMapOvr>
+</p:sld>
+</file>
+
+<file path=ppt/slides/slide9.xml><?xml version="1.0" encoding="utf-8"?>
+<p:sld xmlns:a="http://schemas.openxmlformats.org/drawingml/2006/main" xmlns:r="http://schemas.openxmlformats.org/officeDocument/2006/relationships" xmlns:p="http://schemas.openxmlformats.org/presentationml/2006/main">
+  <p:cSld>
+    <p:spTree>
+      <p:nvGrpSpPr>
+        <p:cNvPr id="1" name=""/>
+        <p:cNvGrpSpPr/>
+        <p:nvPr/>
+      </p:nvGrpSpPr>
+      <p:grpSpPr>
+        <a:xfrm>
+          <a:off x="0" y="0"/>
+          <a:ext cx="0" cy="0"/>
+          <a:chOff x="0" y="0"/>
+          <a:chExt cx="0" cy="0"/>
+        </a:xfrm>
+      </p:grpSpPr>
+      <p:sp>
+        <p:nvSpPr>
+          <p:cNvPr id="2" name="Заголовок 1">
+            <a:extLst>
+              <a:ext uri="{FF2B5EF4-FFF2-40B4-BE49-F238E27FC236}">
+                <a16:creationId xmlns:a16="http://schemas.microsoft.com/office/drawing/2014/main" id="{5E01463B-849D-4DA1-A190-19AF2D932E97}"/>
+              </a:ext>
+            </a:extLst>
+          </p:cNvPr>
+          <p:cNvSpPr>
+            <a:spLocks noGrp="1"/>
+          </p:cNvSpPr>
+          <p:nvPr>
+            <p:ph type="title"/>
+          </p:nvPr>
+        </p:nvSpPr>
+        <p:spPr/>
+        <p:txBody>
+          <a:bodyPr/>
+          <a:lstStyle/>
+          <a:p>
+            <a:r>
+              <a:rPr lang="ru-RU" dirty="0"/>
+              <a:t>Вывод</a:t>
+            </a:r>
+          </a:p>
+        </p:txBody>
+      </p:sp>
+      <p:sp>
+        <p:nvSpPr>
+          <p:cNvPr id="3" name="Объект 2">
+            <a:extLst>
+              <a:ext uri="{FF2B5EF4-FFF2-40B4-BE49-F238E27FC236}">
+                <a16:creationId xmlns:a16="http://schemas.microsoft.com/office/drawing/2014/main" id="{2D983470-276E-42C3-A87A-551B5177A921}"/>
+              </a:ext>
+            </a:extLst>
+          </p:cNvPr>
+          <p:cNvSpPr>
+            <a:spLocks noGrp="1"/>
+          </p:cNvSpPr>
+          <p:nvPr>
+            <p:ph idx="1"/>
+          </p:nvPr>
+        </p:nvSpPr>
+        <p:spPr/>
+        <p:txBody>
+          <a:bodyPr/>
+          <a:lstStyle/>
+          <a:p>
+            <a:r>
+              <a:rPr lang="ru-RU" dirty="0"/>
+              <a:t>У меня получилось воссоздать задуманное. Программа полностью работоспособна</a:t>
+            </a:r>
+            <a:r>
+              <a:rPr lang="en-US" dirty="0"/>
+              <a:t>, </a:t>
+            </a:r>
+            <a:r>
+              <a:rPr lang="ru-RU" dirty="0"/>
+              <a:t>имеет большой функционал. Даже интересно играть.</a:t>
+            </a:r>
+          </a:p>
+          <a:p>
+            <a:endParaRPr lang="ru-RU" dirty="0"/>
+          </a:p>
+        </p:txBody>
+      </p:sp>
+    </p:spTree>
+    <p:extLst>
+      <p:ext uri="{BB962C8B-B14F-4D97-AF65-F5344CB8AC3E}">
+        <p14:creationId xmlns:p14="http://schemas.microsoft.com/office/powerpoint/2010/main" val="1524200507"/>
       </p:ext>
     </p:extLst>
   </p:cSld>
@@ -4486,7 +5047,7 @@
   <a:extraClrSchemeLst/>
   <a:extLst>
     <a:ext uri="{05A4C25C-085E-4340-85A3-A5531E510DB2}">
-      <thm15:themeFamily xmlns:thm15="http://schemas.microsoft.com/office/thememl/2012/main" xmlns="" name="Office Theme" id="{62F939B6-93AF-4DB8-9C6B-D6C7DFDC589F}" vid="{4A3C46E8-61CC-4603-A589-7422A47A8E4A}"/>
+      <thm15:themeFamily xmlns:thm15="http://schemas.microsoft.com/office/thememl/2012/main" name="Office Theme" id="{62F939B6-93AF-4DB8-9C6B-D6C7DFDC589F}" vid="{4A3C46E8-61CC-4603-A589-7422A47A8E4A}"/>
     </a:ext>
   </a:extLst>
 </a:theme>

</xml_diff>